<commit_message>
small changes to API presentation
</commit_message>
<xml_diff>
--- a/1-foundations/4-api-and-dataviz/Introduction to APIs.pptx
+++ b/1-foundations/4-api-and-dataviz/Introduction to APIs.pptx
@@ -241,7 +241,7 @@
           <a:p>
             <a:fld id="{E9435E0D-9C38-451D-A174-6B66EC3D272C}" type="datetimeFigureOut">
               <a:rPr lang="en-US" smtClean="0"/>
-              <a:t>8/6/2022</a:t>
+              <a:t>8/26/2022</a:t>
             </a:fld>
             <a:endParaRPr lang="en-US"/>
           </a:p>
@@ -418,7 +418,7 @@
           <a:p>
             <a:fld id="{B1C46BBB-769C-F640-B863-1BAFC25FDA47}" type="datetimeFigureOut">
               <a:rPr lang="en-US" smtClean="0"/>
-              <a:t>8/6/2022</a:t>
+              <a:t>8/26/2022</a:t>
             </a:fld>
             <a:endParaRPr lang="en-US"/>
           </a:p>
@@ -1106,7 +1106,7 @@
           <a:p>
             <a:fld id="{78BFC871-B6C1-4D4E-A315-E9B623D8EE7D}" type="datetime1">
               <a:rPr lang="en-US" smtClean="0"/>
-              <a:t>8/6/2022</a:t>
+              <a:t>8/26/2022</a:t>
             </a:fld>
             <a:endParaRPr lang="en-US"/>
           </a:p>
@@ -1979,7 +1979,7 @@
           <a:p>
             <a:fld id="{78BFC871-B6C1-4D4E-A315-E9B623D8EE7D}" type="datetime1">
               <a:rPr lang="en-US" smtClean="0"/>
-              <a:t>8/6/2022</a:t>
+              <a:t>8/26/2022</a:t>
             </a:fld>
             <a:endParaRPr lang="en-US"/>
           </a:p>
@@ -2235,7 +2235,7 @@
           <a:p>
             <a:fld id="{78BFC871-B6C1-4D4E-A315-E9B623D8EE7D}" type="datetime1">
               <a:rPr lang="en-US" smtClean="0"/>
-              <a:t>8/6/2022</a:t>
+              <a:t>8/26/2022</a:t>
             </a:fld>
             <a:endParaRPr lang="en-US"/>
           </a:p>
@@ -2746,7 +2746,7 @@
             <a:fld id="{D9AFFF4A-806C-EA44-A220-CFCF99192DAA}" type="datetime1">
               <a:rPr lang="en-US" smtClean="0"/>
               <a:pPr/>
-              <a:t>8/6/2022</a:t>
+              <a:t>8/26/2022</a:t>
             </a:fld>
             <a:endParaRPr lang="en-US" dirty="0"/>
           </a:p>
@@ -3157,7 +3157,7 @@
             <a:fld id="{D9AFFF4A-806C-EA44-A220-CFCF99192DAA}" type="datetime1">
               <a:rPr lang="en-US" smtClean="0"/>
               <a:pPr/>
-              <a:t>8/6/2022</a:t>
+              <a:t>8/26/2022</a:t>
             </a:fld>
             <a:endParaRPr lang="en-US" dirty="0"/>
           </a:p>
@@ -3262,7 +3262,7 @@
           <a:p>
             <a:fld id="{78BFC871-B6C1-4D4E-A315-E9B623D8EE7D}" type="datetime1">
               <a:rPr lang="en-US" smtClean="0"/>
-              <a:t>8/6/2022</a:t>
+              <a:t>8/26/2022</a:t>
             </a:fld>
             <a:endParaRPr lang="en-US"/>
           </a:p>
@@ -4714,7 +4714,7 @@
           <a:p>
             <a:fld id="{78BFC871-B6C1-4D4E-A315-E9B623D8EE7D}" type="datetime1">
               <a:rPr lang="en-US" smtClean="0"/>
-              <a:t>8/6/2022</a:t>
+              <a:t>8/26/2022</a:t>
             </a:fld>
             <a:endParaRPr lang="en-US"/>
           </a:p>
@@ -4881,7 +4881,7 @@
             <a:fld id="{D9AFFF4A-806C-EA44-A220-CFCF99192DAA}" type="datetime1">
               <a:rPr lang="en-US" smtClean="0"/>
               <a:pPr/>
-              <a:t>8/6/2022</a:t>
+              <a:t>8/26/2022</a:t>
             </a:fld>
             <a:endParaRPr lang="en-US" dirty="0"/>
           </a:p>
@@ -5988,7 +5988,7 @@
           <a:p>
             <a:fld id="{78BFC871-B6C1-4D4E-A315-E9B623D8EE7D}" type="datetime1">
               <a:rPr lang="en-US" smtClean="0"/>
-              <a:t>8/6/2022</a:t>
+              <a:t>8/26/2022</a:t>
             </a:fld>
             <a:endParaRPr lang="en-US"/>
           </a:p>
@@ -6524,34 +6524,6 @@
       </p:grpSpPr>
       <p:sp>
         <p:nvSpPr>
-          <p:cNvPr id="2" name="Title 1">
-            <a:extLst>
-              <a:ext uri="{FF2B5EF4-FFF2-40B4-BE49-F238E27FC236}">
-                <a16:creationId xmlns:a16="http://schemas.microsoft.com/office/drawing/2014/main" id="{57F3B0A4-BF7E-4369-AB50-4267A753BF11}"/>
-              </a:ext>
-            </a:extLst>
-          </p:cNvPr>
-          <p:cNvSpPr>
-            <a:spLocks noGrp="1"/>
-          </p:cNvSpPr>
-          <p:nvPr>
-            <p:ph type="title"/>
-          </p:nvPr>
-        </p:nvSpPr>
-        <p:spPr/>
-        <p:txBody>
-          <a:bodyPr/>
-          <a:lstStyle/>
-          <a:p>
-            <a:r>
-              <a:rPr lang="en-US" dirty="0"/>
-              <a:t>Example 1: http://open-notify.org/</a:t>
-            </a:r>
-          </a:p>
-        </p:txBody>
-      </p:sp>
-      <p:sp>
-        <p:nvSpPr>
           <p:cNvPr id="4" name="Date Placeholder 3">
             <a:extLst>
               <a:ext uri="{FF2B5EF4-FFF2-40B4-BE49-F238E27FC236}">
@@ -6574,7 +6546,7 @@
             <a:fld id="{D9AFFF4A-806C-EA44-A220-CFCF99192DAA}" type="datetime1">
               <a:rPr lang="en-US" smtClean="0"/>
               <a:pPr/>
-              <a:t>8/6/2022</a:t>
+              <a:t>8/26/2022</a:t>
             </a:fld>
             <a:endParaRPr lang="en-US" dirty="0"/>
           </a:p>
@@ -6644,6 +6616,39 @@
           </a:ln>
         </p:spPr>
       </p:pic>
+      <p:sp>
+        <p:nvSpPr>
+          <p:cNvPr id="8" name="Title 1">
+            <a:extLst>
+              <a:ext uri="{FF2B5EF4-FFF2-40B4-BE49-F238E27FC236}">
+                <a16:creationId xmlns:a16="http://schemas.microsoft.com/office/drawing/2014/main" id="{571351A3-40F3-42AF-9AD7-33E4B6045A51}"/>
+              </a:ext>
+            </a:extLst>
+          </p:cNvPr>
+          <p:cNvSpPr>
+            <a:spLocks noGrp="1"/>
+          </p:cNvSpPr>
+          <p:nvPr>
+            <p:ph type="title"/>
+          </p:nvPr>
+        </p:nvSpPr>
+        <p:spPr>
+          <a:xfrm>
+            <a:off x="609600" y="274638"/>
+            <a:ext cx="10972800" cy="1143000"/>
+          </a:xfrm>
+        </p:spPr>
+        <p:txBody>
+          <a:bodyPr/>
+          <a:lstStyle/>
+          <a:p>
+            <a:r>
+              <a:rPr lang="en-US" dirty="0"/>
+              <a:t>API Example 1: http://open-notify.org/</a:t>
+            </a:r>
+          </a:p>
+        </p:txBody>
+      </p:sp>
     </p:spTree>
     <p:extLst>
       <p:ext uri="{BB962C8B-B14F-4D97-AF65-F5344CB8AC3E}">
@@ -6699,7 +6704,7 @@
           <a:p>
             <a:r>
               <a:rPr lang="en-US" dirty="0"/>
-              <a:t>Example 2: https://www.geoboundaries.org/</a:t>
+              <a:t>API Example 2: https://www.geoboundaries.org/</a:t>
             </a:r>
           </a:p>
         </p:txBody>
@@ -6728,7 +6733,7 @@
             <a:fld id="{D9AFFF4A-806C-EA44-A220-CFCF99192DAA}" type="datetime1">
               <a:rPr lang="en-US" smtClean="0"/>
               <a:pPr/>
-              <a:t>8/6/2022</a:t>
+              <a:t>8/26/2022</a:t>
             </a:fld>
             <a:endParaRPr lang="en-US" dirty="0"/>
           </a:p>
@@ -6885,36 +6890,6 @@
       </p:grpSpPr>
       <p:sp>
         <p:nvSpPr>
-          <p:cNvPr id="2" name="Title 1">
-            <a:extLst>
-              <a:ext uri="{FF2B5EF4-FFF2-40B4-BE49-F238E27FC236}">
-                <a16:creationId xmlns:a16="http://schemas.microsoft.com/office/drawing/2014/main" id="{57F3B0A4-BF7E-4369-AB50-4267A753BF11}"/>
-              </a:ext>
-            </a:extLst>
-          </p:cNvPr>
-          <p:cNvSpPr>
-            <a:spLocks noGrp="1"/>
-          </p:cNvSpPr>
-          <p:nvPr>
-            <p:ph type="title"/>
-          </p:nvPr>
-        </p:nvSpPr>
-        <p:spPr/>
-        <p:txBody>
-          <a:bodyPr>
-            <a:normAutofit fontScale="90000"/>
-          </a:bodyPr>
-          <a:lstStyle/>
-          <a:p>
-            <a:r>
-              <a:rPr lang="en-US" dirty="0"/>
-              <a:t>Example 2: https://www.geoboundaries.org/</a:t>
-            </a:r>
-          </a:p>
-        </p:txBody>
-      </p:sp>
-      <p:sp>
-        <p:nvSpPr>
           <p:cNvPr id="4" name="Date Placeholder 3">
             <a:extLst>
               <a:ext uri="{FF2B5EF4-FFF2-40B4-BE49-F238E27FC236}">
@@ -6937,7 +6912,7 @@
             <a:fld id="{D9AFFF4A-806C-EA44-A220-CFCF99192DAA}" type="datetime1">
               <a:rPr lang="en-US" smtClean="0"/>
               <a:pPr/>
-              <a:t>8/6/2022</a:t>
+              <a:t>8/26/2022</a:t>
             </a:fld>
             <a:endParaRPr lang="en-US" dirty="0"/>
           </a:p>
@@ -7044,6 +7019,41 @@
           </a:ln>
         </p:spPr>
       </p:pic>
+      <p:sp>
+        <p:nvSpPr>
+          <p:cNvPr id="11" name="Title 1">
+            <a:extLst>
+              <a:ext uri="{FF2B5EF4-FFF2-40B4-BE49-F238E27FC236}">
+                <a16:creationId xmlns:a16="http://schemas.microsoft.com/office/drawing/2014/main" id="{301AF7E4-4AE4-4041-AB11-43F68D53CAED}"/>
+              </a:ext>
+            </a:extLst>
+          </p:cNvPr>
+          <p:cNvSpPr>
+            <a:spLocks noGrp="1"/>
+          </p:cNvSpPr>
+          <p:nvPr>
+            <p:ph type="title"/>
+          </p:nvPr>
+        </p:nvSpPr>
+        <p:spPr>
+          <a:xfrm>
+            <a:off x="609600" y="274638"/>
+            <a:ext cx="10972800" cy="1143000"/>
+          </a:xfrm>
+        </p:spPr>
+        <p:txBody>
+          <a:bodyPr>
+            <a:normAutofit fontScale="90000"/>
+          </a:bodyPr>
+          <a:lstStyle/>
+          <a:p>
+            <a:r>
+              <a:rPr lang="en-US" dirty="0"/>
+              <a:t>API Example 2: https://www.geoboundaries.org/</a:t>
+            </a:r>
+          </a:p>
+        </p:txBody>
+      </p:sp>
     </p:spTree>
     <p:extLst>
       <p:ext uri="{BB962C8B-B14F-4D97-AF65-F5344CB8AC3E}">
@@ -7128,7 +7138,7 @@
             <a:fld id="{D9AFFF4A-806C-EA44-A220-CFCF99192DAA}" type="datetime1">
               <a:rPr lang="en-US" smtClean="0"/>
               <a:pPr/>
-              <a:t>8/6/2022</a:t>
+              <a:t>8/26/2022</a:t>
             </a:fld>
             <a:endParaRPr lang="en-US" dirty="0"/>
           </a:p>
@@ -7399,7 +7409,7 @@
             <a:fld id="{D9AFFF4A-806C-EA44-A220-CFCF99192DAA}" type="datetime1">
               <a:rPr lang="en-US" smtClean="0"/>
               <a:pPr/>
-              <a:t>8/6/2022</a:t>
+              <a:t>8/26/2022</a:t>
             </a:fld>
             <a:endParaRPr lang="en-US" dirty="0"/>
           </a:p>
@@ -7603,7 +7613,7 @@
             <a:fld id="{D9AFFF4A-806C-EA44-A220-CFCF99192DAA}" type="datetime1">
               <a:rPr lang="en-US" smtClean="0"/>
               <a:pPr/>
-              <a:t>8/6/2022</a:t>
+              <a:t>8/26/2022</a:t>
             </a:fld>
             <a:endParaRPr lang="en-US" dirty="0"/>
           </a:p>
@@ -8107,7 +8117,7 @@
                   <a:spcPts val="600"/>
                 </a:spcAft>
               </a:pPr>
-              <a:t>8/6/2022</a:t>
+              <a:t>8/26/2022</a:t>
             </a:fld>
             <a:endParaRPr lang="en-US" dirty="0"/>
           </a:p>
@@ -9002,7 +9012,7 @@
             <a:fld id="{D9AFFF4A-806C-EA44-A220-CFCF99192DAA}" type="datetime1">
               <a:rPr lang="en-US" smtClean="0"/>
               <a:pPr/>
-              <a:t>8/6/2022</a:t>
+              <a:t>8/26/2022</a:t>
             </a:fld>
             <a:endParaRPr lang="en-US" dirty="0"/>
           </a:p>
@@ -10960,7 +10970,7 @@
             <a:fld id="{D9AFFF4A-806C-EA44-A220-CFCF99192DAA}" type="datetime1">
               <a:rPr lang="en-US" smtClean="0"/>
               <a:pPr/>
-              <a:t>8/6/2022</a:t>
+              <a:t>8/26/2022</a:t>
             </a:fld>
             <a:endParaRPr lang="en-US" dirty="0"/>
           </a:p>
@@ -13451,7 +13461,7 @@
             <a:fld id="{D9AFFF4A-806C-EA44-A220-CFCF99192DAA}" type="datetime1">
               <a:rPr lang="en-US" smtClean="0"/>
               <a:pPr/>
-              <a:t>8/6/2022</a:t>
+              <a:t>8/26/2022</a:t>
             </a:fld>
             <a:endParaRPr lang="en-US" dirty="0"/>
           </a:p>
@@ -13670,7 +13680,7 @@
             <a:fld id="{D9AFFF4A-806C-EA44-A220-CFCF99192DAA}" type="datetime1">
               <a:rPr lang="en-US" smtClean="0"/>
               <a:pPr/>
-              <a:t>8/6/2022</a:t>
+              <a:t>8/26/2022</a:t>
             </a:fld>
             <a:endParaRPr lang="en-US" dirty="0"/>
           </a:p>
@@ -13759,7 +13769,7 @@
           <a:p>
             <a:r>
               <a:rPr lang="en-US" dirty="0"/>
-              <a:t>Example 1: http://open-notify.org/</a:t>
+              <a:t>API Example 1: http://open-notify.org/</a:t>
             </a:r>
           </a:p>
         </p:txBody>
@@ -13788,7 +13798,7 @@
             <a:fld id="{D9AFFF4A-806C-EA44-A220-CFCF99192DAA}" type="datetime1">
               <a:rPr lang="en-US" smtClean="0"/>
               <a:pPr/>
-              <a:t>8/6/2022</a:t>
+              <a:t>8/26/2022</a:t>
             </a:fld>
             <a:endParaRPr lang="en-US" dirty="0"/>
           </a:p>
@@ -14075,34 +14085,6 @@
       </p:grpSpPr>
       <p:sp>
         <p:nvSpPr>
-          <p:cNvPr id="2" name="Title 1">
-            <a:extLst>
-              <a:ext uri="{FF2B5EF4-FFF2-40B4-BE49-F238E27FC236}">
-                <a16:creationId xmlns:a16="http://schemas.microsoft.com/office/drawing/2014/main" id="{57F3B0A4-BF7E-4369-AB50-4267A753BF11}"/>
-              </a:ext>
-            </a:extLst>
-          </p:cNvPr>
-          <p:cNvSpPr>
-            <a:spLocks noGrp="1"/>
-          </p:cNvSpPr>
-          <p:nvPr>
-            <p:ph type="title"/>
-          </p:nvPr>
-        </p:nvSpPr>
-        <p:spPr/>
-        <p:txBody>
-          <a:bodyPr/>
-          <a:lstStyle/>
-          <a:p>
-            <a:r>
-              <a:rPr lang="en-US" dirty="0"/>
-              <a:t>Example 1: http://open-notify.org/</a:t>
-            </a:r>
-          </a:p>
-        </p:txBody>
-      </p:sp>
-      <p:sp>
-        <p:nvSpPr>
           <p:cNvPr id="4" name="Date Placeholder 3">
             <a:extLst>
               <a:ext uri="{FF2B5EF4-FFF2-40B4-BE49-F238E27FC236}">
@@ -14125,7 +14107,7 @@
             <a:fld id="{D9AFFF4A-806C-EA44-A220-CFCF99192DAA}" type="datetime1">
               <a:rPr lang="en-US" smtClean="0"/>
               <a:pPr/>
-              <a:t>8/6/2022</a:t>
+              <a:t>8/26/2022</a:t>
             </a:fld>
             <a:endParaRPr lang="en-US" dirty="0"/>
           </a:p>
@@ -14196,6 +14178,39 @@
           </a:ln>
         </p:spPr>
       </p:pic>
+      <p:sp>
+        <p:nvSpPr>
+          <p:cNvPr id="10" name="Title 1">
+            <a:extLst>
+              <a:ext uri="{FF2B5EF4-FFF2-40B4-BE49-F238E27FC236}">
+                <a16:creationId xmlns:a16="http://schemas.microsoft.com/office/drawing/2014/main" id="{5E0922C2-0DF7-4FD8-81A6-C7774B0EF3DF}"/>
+              </a:ext>
+            </a:extLst>
+          </p:cNvPr>
+          <p:cNvSpPr>
+            <a:spLocks noGrp="1"/>
+          </p:cNvSpPr>
+          <p:nvPr>
+            <p:ph type="title"/>
+          </p:nvPr>
+        </p:nvSpPr>
+        <p:spPr>
+          <a:xfrm>
+            <a:off x="609600" y="274638"/>
+            <a:ext cx="10972800" cy="1143000"/>
+          </a:xfrm>
+        </p:spPr>
+        <p:txBody>
+          <a:bodyPr/>
+          <a:lstStyle/>
+          <a:p>
+            <a:r>
+              <a:rPr lang="en-US" dirty="0"/>
+              <a:t>API Example 1: http://open-notify.org/</a:t>
+            </a:r>
+          </a:p>
+        </p:txBody>
+      </p:sp>
     </p:spTree>
     <p:extLst>
       <p:ext uri="{BB962C8B-B14F-4D97-AF65-F5344CB8AC3E}">

</xml_diff>

<commit_message>
added a slide for motivation (slide 7)
</commit_message>
<xml_diff>
--- a/1-foundations/4-api-and-dataviz/Introduction to APIs.pptx
+++ b/1-foundations/4-api-and-dataviz/Introduction to APIs.pptx
@@ -5,10 +5,10 @@
     <p:sldMasterId id="2147483648" r:id="rId1"/>
   </p:sldMasterIdLst>
   <p:notesMasterIdLst>
-    <p:notesMasterId r:id="rId18"/>
+    <p:notesMasterId r:id="rId19"/>
   </p:notesMasterIdLst>
   <p:handoutMasterIdLst>
-    <p:handoutMasterId r:id="rId19"/>
+    <p:handoutMasterId r:id="rId20"/>
   </p:handoutMasterIdLst>
   <p:sldIdLst>
     <p:sldId id="258" r:id="rId2"/>
@@ -17,16 +17,17 @@
     <p:sldId id="343" r:id="rId5"/>
     <p:sldId id="345" r:id="rId6"/>
     <p:sldId id="367" r:id="rId7"/>
-    <p:sldId id="368" r:id="rId8"/>
-    <p:sldId id="347" r:id="rId9"/>
-    <p:sldId id="369" r:id="rId10"/>
-    <p:sldId id="370" r:id="rId11"/>
-    <p:sldId id="374" r:id="rId12"/>
-    <p:sldId id="375" r:id="rId13"/>
-    <p:sldId id="376" r:id="rId14"/>
-    <p:sldId id="378" r:id="rId15"/>
-    <p:sldId id="377" r:id="rId16"/>
-    <p:sldId id="339" r:id="rId17"/>
+    <p:sldId id="379" r:id="rId8"/>
+    <p:sldId id="368" r:id="rId9"/>
+    <p:sldId id="347" r:id="rId10"/>
+    <p:sldId id="369" r:id="rId11"/>
+    <p:sldId id="370" r:id="rId12"/>
+    <p:sldId id="374" r:id="rId13"/>
+    <p:sldId id="375" r:id="rId14"/>
+    <p:sldId id="376" r:id="rId15"/>
+    <p:sldId id="378" r:id="rId16"/>
+    <p:sldId id="377" r:id="rId17"/>
+    <p:sldId id="339" r:id="rId18"/>
   </p:sldIdLst>
   <p:sldSz cx="12192000" cy="6858000"/>
   <p:notesSz cx="6858000" cy="9144000"/>
@@ -241,7 +242,7 @@
           <a:p>
             <a:fld id="{E9435E0D-9C38-451D-A174-6B66EC3D272C}" type="datetimeFigureOut">
               <a:rPr lang="en-US" smtClean="0"/>
-              <a:t>8/26/2022</a:t>
+              <a:t>2/9/2023</a:t>
             </a:fld>
             <a:endParaRPr lang="en-US"/>
           </a:p>
@@ -418,7 +419,7 @@
           <a:p>
             <a:fld id="{B1C46BBB-769C-F640-B863-1BAFC25FDA47}" type="datetimeFigureOut">
               <a:rPr lang="en-US" smtClean="0"/>
-              <a:t>8/26/2022</a:t>
+              <a:t>2/9/2023</a:t>
             </a:fld>
             <a:endParaRPr lang="en-US"/>
           </a:p>
@@ -1106,7 +1107,7 @@
           <a:p>
             <a:fld id="{78BFC871-B6C1-4D4E-A315-E9B623D8EE7D}" type="datetime1">
               <a:rPr lang="en-US" smtClean="0"/>
-              <a:t>8/26/2022</a:t>
+              <a:t>2/9/2023</a:t>
             </a:fld>
             <a:endParaRPr lang="en-US"/>
           </a:p>
@@ -1979,7 +1980,7 @@
           <a:p>
             <a:fld id="{78BFC871-B6C1-4D4E-A315-E9B623D8EE7D}" type="datetime1">
               <a:rPr lang="en-US" smtClean="0"/>
-              <a:t>8/26/2022</a:t>
+              <a:t>2/9/2023</a:t>
             </a:fld>
             <a:endParaRPr lang="en-US"/>
           </a:p>
@@ -2235,7 +2236,7 @@
           <a:p>
             <a:fld id="{78BFC871-B6C1-4D4E-A315-E9B623D8EE7D}" type="datetime1">
               <a:rPr lang="en-US" smtClean="0"/>
-              <a:t>8/26/2022</a:t>
+              <a:t>2/9/2023</a:t>
             </a:fld>
             <a:endParaRPr lang="en-US"/>
           </a:p>
@@ -2746,7 +2747,7 @@
             <a:fld id="{D9AFFF4A-806C-EA44-A220-CFCF99192DAA}" type="datetime1">
               <a:rPr lang="en-US" smtClean="0"/>
               <a:pPr/>
-              <a:t>8/26/2022</a:t>
+              <a:t>2/9/2023</a:t>
             </a:fld>
             <a:endParaRPr lang="en-US" dirty="0"/>
           </a:p>
@@ -3157,7 +3158,7 @@
             <a:fld id="{D9AFFF4A-806C-EA44-A220-CFCF99192DAA}" type="datetime1">
               <a:rPr lang="en-US" smtClean="0"/>
               <a:pPr/>
-              <a:t>8/26/2022</a:t>
+              <a:t>2/9/2023</a:t>
             </a:fld>
             <a:endParaRPr lang="en-US" dirty="0"/>
           </a:p>
@@ -3262,7 +3263,7 @@
           <a:p>
             <a:fld id="{78BFC871-B6C1-4D4E-A315-E9B623D8EE7D}" type="datetime1">
               <a:rPr lang="en-US" smtClean="0"/>
-              <a:t>8/26/2022</a:t>
+              <a:t>2/9/2023</a:t>
             </a:fld>
             <a:endParaRPr lang="en-US"/>
           </a:p>
@@ -4714,7 +4715,7 @@
           <a:p>
             <a:fld id="{78BFC871-B6C1-4D4E-A315-E9B623D8EE7D}" type="datetime1">
               <a:rPr lang="en-US" smtClean="0"/>
-              <a:t>8/26/2022</a:t>
+              <a:t>2/9/2023</a:t>
             </a:fld>
             <a:endParaRPr lang="en-US"/>
           </a:p>
@@ -4881,7 +4882,7 @@
             <a:fld id="{D9AFFF4A-806C-EA44-A220-CFCF99192DAA}" type="datetime1">
               <a:rPr lang="en-US" smtClean="0"/>
               <a:pPr/>
-              <a:t>8/26/2022</a:t>
+              <a:t>2/9/2023</a:t>
             </a:fld>
             <a:endParaRPr lang="en-US" dirty="0"/>
           </a:p>
@@ -5988,7 +5989,7 @@
           <a:p>
             <a:fld id="{78BFC871-B6C1-4D4E-A315-E9B623D8EE7D}" type="datetime1">
               <a:rPr lang="en-US" smtClean="0"/>
-              <a:t>8/26/2022</a:t>
+              <a:t>2/9/2023</a:t>
             </a:fld>
             <a:endParaRPr lang="en-US"/>
           </a:p>
@@ -6457,7 +6458,7 @@
           <a:p>
             <a:r>
               <a:rPr lang="en-US" sz="1800" dirty="0"/>
-              <a:t>August 2022</a:t>
+              <a:t>February 2023</a:t>
             </a:r>
           </a:p>
         </p:txBody>
@@ -6546,7 +6547,7 @@
             <a:fld id="{D9AFFF4A-806C-EA44-A220-CFCF99192DAA}" type="datetime1">
               <a:rPr lang="en-US" smtClean="0"/>
               <a:pPr/>
-              <a:t>8/26/2022</a:t>
+              <a:t>2/9/2023</a:t>
             </a:fld>
             <a:endParaRPr lang="en-US" dirty="0"/>
           </a:p>
@@ -6577,6 +6578,164 @@
               <a:rPr lang="en-US" smtClean="0"/>
               <a:pPr/>
               <a:t>10</a:t>
+            </a:fld>
+            <a:endParaRPr lang="en-US" dirty="0"/>
+          </a:p>
+        </p:txBody>
+      </p:sp>
+      <p:pic>
+        <p:nvPicPr>
+          <p:cNvPr id="8" name="Picture 7">
+            <a:extLst>
+              <a:ext uri="{FF2B5EF4-FFF2-40B4-BE49-F238E27FC236}">
+                <a16:creationId xmlns:a16="http://schemas.microsoft.com/office/drawing/2014/main" id="{38626BF0-108E-4CDB-AA77-B7D47F88098F}"/>
+              </a:ext>
+            </a:extLst>
+          </p:cNvPr>
+          <p:cNvPicPr>
+            <a:picLocks noChangeAspect="1"/>
+          </p:cNvPicPr>
+          <p:nvPr/>
+        </p:nvPicPr>
+        <p:blipFill>
+          <a:blip r:embed="rId2"/>
+          <a:stretch>
+            <a:fillRect/>
+          </a:stretch>
+        </p:blipFill>
+        <p:spPr>
+          <a:xfrm>
+            <a:off x="1223962" y="1676400"/>
+            <a:ext cx="9744075" cy="4591050"/>
+          </a:xfrm>
+          <a:prstGeom prst="rect">
+            <a:avLst/>
+          </a:prstGeom>
+          <a:ln>
+            <a:solidFill>
+              <a:schemeClr val="tx1"/>
+            </a:solidFill>
+          </a:ln>
+        </p:spPr>
+      </p:pic>
+      <p:sp>
+        <p:nvSpPr>
+          <p:cNvPr id="10" name="Title 1">
+            <a:extLst>
+              <a:ext uri="{FF2B5EF4-FFF2-40B4-BE49-F238E27FC236}">
+                <a16:creationId xmlns:a16="http://schemas.microsoft.com/office/drawing/2014/main" id="{5E0922C2-0DF7-4FD8-81A6-C7774B0EF3DF}"/>
+              </a:ext>
+            </a:extLst>
+          </p:cNvPr>
+          <p:cNvSpPr>
+            <a:spLocks noGrp="1"/>
+          </p:cNvSpPr>
+          <p:nvPr>
+            <p:ph type="title"/>
+          </p:nvPr>
+        </p:nvSpPr>
+        <p:spPr>
+          <a:xfrm>
+            <a:off x="609600" y="274638"/>
+            <a:ext cx="10972800" cy="1143000"/>
+          </a:xfrm>
+        </p:spPr>
+        <p:txBody>
+          <a:bodyPr/>
+          <a:lstStyle/>
+          <a:p>
+            <a:r>
+              <a:rPr lang="en-US" dirty="0"/>
+              <a:t>API Example 1: http://open-notify.org/</a:t>
+            </a:r>
+          </a:p>
+        </p:txBody>
+      </p:sp>
+    </p:spTree>
+    <p:extLst>
+      <p:ext uri="{BB962C8B-B14F-4D97-AF65-F5344CB8AC3E}">
+        <p14:creationId xmlns:p14="http://schemas.microsoft.com/office/powerpoint/2010/main" val="2310581136"/>
+      </p:ext>
+    </p:extLst>
+  </p:cSld>
+  <p:clrMapOvr>
+    <a:masterClrMapping/>
+  </p:clrMapOvr>
+</p:sld>
+</file>
+
+<file path=ppt/slides/slide11.xml><?xml version="1.0" encoding="utf-8"?>
+<p:sld xmlns:a="http://schemas.openxmlformats.org/drawingml/2006/main" xmlns:r="http://schemas.openxmlformats.org/officeDocument/2006/relationships" xmlns:p="http://schemas.openxmlformats.org/presentationml/2006/main">
+  <p:cSld>
+    <p:spTree>
+      <p:nvGrpSpPr>
+        <p:cNvPr id="1" name=""/>
+        <p:cNvGrpSpPr/>
+        <p:nvPr/>
+      </p:nvGrpSpPr>
+      <p:grpSpPr>
+        <a:xfrm>
+          <a:off x="0" y="0"/>
+          <a:ext cx="0" cy="0"/>
+          <a:chOff x="0" y="0"/>
+          <a:chExt cx="0" cy="0"/>
+        </a:xfrm>
+      </p:grpSpPr>
+      <p:sp>
+        <p:nvSpPr>
+          <p:cNvPr id="4" name="Date Placeholder 3">
+            <a:extLst>
+              <a:ext uri="{FF2B5EF4-FFF2-40B4-BE49-F238E27FC236}">
+                <a16:creationId xmlns:a16="http://schemas.microsoft.com/office/drawing/2014/main" id="{655AC432-702E-4E27-9A2D-421B517886B7}"/>
+              </a:ext>
+            </a:extLst>
+          </p:cNvPr>
+          <p:cNvSpPr>
+            <a:spLocks noGrp="1"/>
+          </p:cNvSpPr>
+          <p:nvPr>
+            <p:ph type="dt" sz="half" idx="10"/>
+          </p:nvPr>
+        </p:nvSpPr>
+        <p:spPr/>
+        <p:txBody>
+          <a:bodyPr/>
+          <a:lstStyle/>
+          <a:p>
+            <a:fld id="{D9AFFF4A-806C-EA44-A220-CFCF99192DAA}" type="datetime1">
+              <a:rPr lang="en-US" smtClean="0"/>
+              <a:pPr/>
+              <a:t>2/9/2023</a:t>
+            </a:fld>
+            <a:endParaRPr lang="en-US" dirty="0"/>
+          </a:p>
+        </p:txBody>
+      </p:sp>
+      <p:sp>
+        <p:nvSpPr>
+          <p:cNvPr id="5" name="Slide Number Placeholder 4">
+            <a:extLst>
+              <a:ext uri="{FF2B5EF4-FFF2-40B4-BE49-F238E27FC236}">
+                <a16:creationId xmlns:a16="http://schemas.microsoft.com/office/drawing/2014/main" id="{F83CB343-BF9D-4258-AE05-92023B52C8F8}"/>
+              </a:ext>
+            </a:extLst>
+          </p:cNvPr>
+          <p:cNvSpPr>
+            <a:spLocks noGrp="1"/>
+          </p:cNvSpPr>
+          <p:nvPr>
+            <p:ph type="sldNum" sz="quarter" idx="12"/>
+          </p:nvPr>
+        </p:nvSpPr>
+        <p:spPr/>
+        <p:txBody>
+          <a:bodyPr/>
+          <a:lstStyle/>
+          <a:p>
+            <a:fld id="{4FAB73BC-B049-4115-A692-8D63A059BFB8}" type="slidenum">
+              <a:rPr lang="en-US" smtClean="0"/>
+              <a:pPr/>
+              <a:t>11</a:t>
             </a:fld>
             <a:endParaRPr lang="en-US" dirty="0"/>
           </a:p>
@@ -6662,7 +6821,7 @@
 </p:sld>
 </file>
 
-<file path=ppt/slides/slide11.xml><?xml version="1.0" encoding="utf-8"?>
+<file path=ppt/slides/slide12.xml><?xml version="1.0" encoding="utf-8"?>
 <p:sld xmlns:a="http://schemas.openxmlformats.org/drawingml/2006/main" xmlns:r="http://schemas.openxmlformats.org/officeDocument/2006/relationships" xmlns:p="http://schemas.openxmlformats.org/presentationml/2006/main">
   <p:cSld>
     <p:spTree>
@@ -6733,7 +6892,7 @@
             <a:fld id="{D9AFFF4A-806C-EA44-A220-CFCF99192DAA}" type="datetime1">
               <a:rPr lang="en-US" smtClean="0"/>
               <a:pPr/>
-              <a:t>8/26/2022</a:t>
+              <a:t>2/9/2023</a:t>
             </a:fld>
             <a:endParaRPr lang="en-US" dirty="0"/>
           </a:p>
@@ -6763,7 +6922,7 @@
             <a:fld id="{4FAB73BC-B049-4115-A692-8D63A059BFB8}" type="slidenum">
               <a:rPr lang="en-US" smtClean="0"/>
               <a:pPr/>
-              <a:t>11</a:t>
+              <a:t>12</a:t>
             </a:fld>
             <a:endParaRPr lang="en-US" dirty="0"/>
           </a:p>
@@ -6871,7 +7030,7 @@
 </p:sld>
 </file>
 
-<file path=ppt/slides/slide12.xml><?xml version="1.0" encoding="utf-8"?>
+<file path=ppt/slides/slide13.xml><?xml version="1.0" encoding="utf-8"?>
 <p:sld xmlns:a="http://schemas.openxmlformats.org/drawingml/2006/main" xmlns:r="http://schemas.openxmlformats.org/officeDocument/2006/relationships" xmlns:p="http://schemas.openxmlformats.org/presentationml/2006/main">
   <p:cSld>
     <p:spTree>
@@ -6912,7 +7071,7 @@
             <a:fld id="{D9AFFF4A-806C-EA44-A220-CFCF99192DAA}" type="datetime1">
               <a:rPr lang="en-US" smtClean="0"/>
               <a:pPr/>
-              <a:t>8/26/2022</a:t>
+              <a:t>2/9/2023</a:t>
             </a:fld>
             <a:endParaRPr lang="en-US" dirty="0"/>
           </a:p>
@@ -6942,7 +7101,7 @@
             <a:fld id="{4FAB73BC-B049-4115-A692-8D63A059BFB8}" type="slidenum">
               <a:rPr lang="en-US" smtClean="0"/>
               <a:pPr/>
-              <a:t>12</a:t>
+              <a:t>13</a:t>
             </a:fld>
             <a:endParaRPr lang="en-US" dirty="0"/>
           </a:p>
@@ -7067,7 +7226,7 @@
 </p:sld>
 </file>
 
-<file path=ppt/slides/slide13.xml><?xml version="1.0" encoding="utf-8"?>
+<file path=ppt/slides/slide14.xml><?xml version="1.0" encoding="utf-8"?>
 <p:sld xmlns:a="http://schemas.openxmlformats.org/drawingml/2006/main" xmlns:r="http://schemas.openxmlformats.org/officeDocument/2006/relationships" xmlns:p="http://schemas.openxmlformats.org/presentationml/2006/main">
   <p:cSld>
     <p:spTree>
@@ -7138,7 +7297,7 @@
             <a:fld id="{D9AFFF4A-806C-EA44-A220-CFCF99192DAA}" type="datetime1">
               <a:rPr lang="en-US" smtClean="0"/>
               <a:pPr/>
-              <a:t>8/26/2022</a:t>
+              <a:t>2/9/2023</a:t>
             </a:fld>
             <a:endParaRPr lang="en-US" dirty="0"/>
           </a:p>
@@ -7168,7 +7327,7 @@
             <a:fld id="{4FAB73BC-B049-4115-A692-8D63A059BFB8}" type="slidenum">
               <a:rPr lang="en-US" smtClean="0"/>
               <a:pPr/>
-              <a:t>13</a:t>
+              <a:t>14</a:t>
             </a:fld>
             <a:endParaRPr lang="en-US" dirty="0"/>
           </a:p>
@@ -7338,7 +7497,7 @@
 </p:sld>
 </file>
 
-<file path=ppt/slides/slide14.xml><?xml version="1.0" encoding="utf-8"?>
+<file path=ppt/slides/slide15.xml><?xml version="1.0" encoding="utf-8"?>
 <p:sld xmlns:a="http://schemas.openxmlformats.org/drawingml/2006/main" xmlns:r="http://schemas.openxmlformats.org/officeDocument/2006/relationships" xmlns:p="http://schemas.openxmlformats.org/presentationml/2006/main">
   <p:cSld>
     <p:spTree>
@@ -7409,7 +7568,7 @@
             <a:fld id="{D9AFFF4A-806C-EA44-A220-CFCF99192DAA}" type="datetime1">
               <a:rPr lang="en-US" smtClean="0"/>
               <a:pPr/>
-              <a:t>8/26/2022</a:t>
+              <a:t>2/9/2023</a:t>
             </a:fld>
             <a:endParaRPr lang="en-US" dirty="0"/>
           </a:p>
@@ -7439,7 +7598,7 @@
             <a:fld id="{4FAB73BC-B049-4115-A692-8D63A059BFB8}" type="slidenum">
               <a:rPr lang="en-US" smtClean="0"/>
               <a:pPr/>
-              <a:t>14</a:t>
+              <a:t>15</a:t>
             </a:fld>
             <a:endParaRPr lang="en-US" dirty="0"/>
           </a:p>
@@ -7542,7 +7701,7 @@
 </p:sld>
 </file>
 
-<file path=ppt/slides/slide15.xml><?xml version="1.0" encoding="utf-8"?>
+<file path=ppt/slides/slide16.xml><?xml version="1.0" encoding="utf-8"?>
 <p:sld xmlns:a="http://schemas.openxmlformats.org/drawingml/2006/main" xmlns:r="http://schemas.openxmlformats.org/officeDocument/2006/relationships" xmlns:p="http://schemas.openxmlformats.org/presentationml/2006/main">
   <p:cSld>
     <p:spTree>
@@ -7613,7 +7772,7 @@
             <a:fld id="{D9AFFF4A-806C-EA44-A220-CFCF99192DAA}" type="datetime1">
               <a:rPr lang="en-US" smtClean="0"/>
               <a:pPr/>
-              <a:t>8/26/2022</a:t>
+              <a:t>2/9/2023</a:t>
             </a:fld>
             <a:endParaRPr lang="en-US" dirty="0"/>
           </a:p>
@@ -7643,7 +7802,7 @@
             <a:fld id="{4FAB73BC-B049-4115-A692-8D63A059BFB8}" type="slidenum">
               <a:rPr lang="en-US" smtClean="0"/>
               <a:pPr/>
-              <a:t>15</a:t>
+              <a:t>16</a:t>
             </a:fld>
             <a:endParaRPr lang="en-US" dirty="0"/>
           </a:p>
@@ -7697,7 +7856,7 @@
 </p:sld>
 </file>
 
-<file path=ppt/slides/slide16.xml><?xml version="1.0" encoding="utf-8"?>
+<file path=ppt/slides/slide17.xml><?xml version="1.0" encoding="utf-8"?>
 <p:sld xmlns:a="http://schemas.openxmlformats.org/drawingml/2006/main" xmlns:r="http://schemas.openxmlformats.org/officeDocument/2006/relationships" xmlns:p="http://schemas.openxmlformats.org/presentationml/2006/main">
   <p:cSld>
     <p:spTree>
@@ -8117,7 +8276,7 @@
                   <a:spcPts val="600"/>
                 </a:spcAft>
               </a:pPr>
-              <a:t>8/26/2022</a:t>
+              <a:t>2/9/2023</a:t>
             </a:fld>
             <a:endParaRPr lang="en-US" dirty="0"/>
           </a:p>
@@ -9012,7 +9171,7 @@
             <a:fld id="{D9AFFF4A-806C-EA44-A220-CFCF99192DAA}" type="datetime1">
               <a:rPr lang="en-US" smtClean="0"/>
               <a:pPr/>
-              <a:t>8/26/2022</a:t>
+              <a:t>2/9/2023</a:t>
             </a:fld>
             <a:endParaRPr lang="en-US" dirty="0"/>
           </a:p>
@@ -10970,7 +11129,7 @@
             <a:fld id="{D9AFFF4A-806C-EA44-A220-CFCF99192DAA}" type="datetime1">
               <a:rPr lang="en-US" smtClean="0"/>
               <a:pPr/>
-              <a:t>8/26/2022</a:t>
+              <a:t>2/9/2023</a:t>
             </a:fld>
             <a:endParaRPr lang="en-US" dirty="0"/>
           </a:p>
@@ -13461,7 +13620,7 @@
             <a:fld id="{D9AFFF4A-806C-EA44-A220-CFCF99192DAA}" type="datetime1">
               <a:rPr lang="en-US" smtClean="0"/>
               <a:pPr/>
-              <a:t>8/26/2022</a:t>
+              <a:t>2/9/2023</a:t>
             </a:fld>
             <a:endParaRPr lang="en-US" dirty="0"/>
           </a:p>
@@ -13571,88 +13730,43 @@
             <p:ph idx="1"/>
           </p:nvPr>
         </p:nvSpPr>
-        <p:spPr>
-          <a:xfrm>
-            <a:off x="609600" y="1774015"/>
-            <a:ext cx="10972800" cy="4702985"/>
-          </a:xfrm>
-        </p:spPr>
+        <p:spPr/>
         <p:txBody>
           <a:bodyPr anchor="ctr"/>
           <a:lstStyle/>
           <a:p>
             <a:r>
               <a:rPr lang="en-US" dirty="0"/>
-              <a:t>How to use an API</a:t>
-            </a:r>
-          </a:p>
-          <a:p>
-            <a:pPr marL="971550" lvl="1" indent="-514350">
-              <a:buFont typeface="+mj-lt"/>
-              <a:buAutoNum type="arabicPeriod"/>
-            </a:pPr>
+              <a:t>Why an API?</a:t>
+            </a:r>
+          </a:p>
+          <a:p>
+            <a:endParaRPr lang="en-US" dirty="0"/>
+          </a:p>
+          <a:p>
+            <a:pPr lvl="1"/>
             <a:r>
               <a:rPr lang="en-US" dirty="0"/>
-              <a:t>Read the API documentation</a:t>
-            </a:r>
-          </a:p>
-          <a:p>
-            <a:pPr marL="971550" lvl="1" indent="-514350">
-              <a:buFont typeface="+mj-lt"/>
-              <a:buAutoNum type="arabicPeriod"/>
-            </a:pPr>
+              <a:t>Allows to access data programmatically</a:t>
+            </a:r>
+          </a:p>
+          <a:p>
+            <a:pPr lvl="2"/>
             <a:r>
               <a:rPr lang="en-US" dirty="0"/>
-              <a:t>Find the API endpoint</a:t>
-            </a:r>
-          </a:p>
-          <a:p>
-            <a:pPr marL="971550" lvl="1" indent="-514350">
-              <a:buFont typeface="+mj-lt"/>
-              <a:buAutoNum type="arabicPeriod"/>
-            </a:pPr>
+              <a:t>No more sharing data and code for a project, only code</a:t>
+            </a:r>
+          </a:p>
+          <a:p>
+            <a:pPr lvl="2"/>
+            <a:endParaRPr lang="en-US" dirty="0"/>
+          </a:p>
+          <a:p>
+            <a:pPr lvl="1"/>
             <a:r>
               <a:rPr lang="en-US" dirty="0"/>
-              <a:t>Explore the endpoint</a:t>
-            </a:r>
-          </a:p>
-          <a:p>
-            <a:pPr marL="1371600" lvl="2" indent="-514350"/>
-            <a:r>
-              <a:rPr lang="en-US" dirty="0"/>
-              <a:t>Start by trying a simple query in your web browser</a:t>
-            </a:r>
-          </a:p>
-          <a:p>
-            <a:pPr marL="971550" lvl="1" indent="-514350">
-              <a:buFont typeface="+mj-lt"/>
-              <a:buAutoNum type="arabicPeriod"/>
-            </a:pPr>
-            <a:r>
-              <a:rPr lang="en-US" dirty="0"/>
-              <a:t>Explore the API result</a:t>
-            </a:r>
-          </a:p>
-          <a:p>
-            <a:pPr marL="1371600" lvl="2" indent="-514350"/>
-            <a:r>
-              <a:rPr lang="en-US" dirty="0"/>
-              <a:t>JSON is a widely used data format. It consists of nested dictionaries and lists</a:t>
-            </a:r>
-          </a:p>
-          <a:p>
-            <a:pPr marL="971550" lvl="1" indent="-514350">
-              <a:buFont typeface="+mj-lt"/>
-              <a:buAutoNum type="arabicPeriod"/>
-            </a:pPr>
-            <a:r>
-              <a:rPr lang="en-US" dirty="0"/>
-              <a:t>Write code to send custom API requests</a:t>
-            </a:r>
-          </a:p>
-          <a:p>
-            <a:pPr marL="1371600" lvl="2" indent="-514350"/>
-            <a:endParaRPr lang="en-US" dirty="0"/>
+              <a:t>Allows to run code on the most recent data available</a:t>
+            </a:r>
           </a:p>
         </p:txBody>
       </p:sp>
@@ -13680,7 +13794,7 @@
             <a:fld id="{D9AFFF4A-806C-EA44-A220-CFCF99192DAA}" type="datetime1">
               <a:rPr lang="en-US" smtClean="0"/>
               <a:pPr/>
-              <a:t>8/26/2022</a:t>
+              <a:t>2/9/2023</a:t>
             </a:fld>
             <a:endParaRPr lang="en-US" dirty="0"/>
           </a:p>
@@ -13719,7 +13833,7 @@
     </p:spTree>
     <p:extLst>
       <p:ext uri="{BB962C8B-B14F-4D97-AF65-F5344CB8AC3E}">
-        <p14:creationId xmlns:p14="http://schemas.microsoft.com/office/powerpoint/2010/main" val="2744176874"/>
+        <p14:creationId xmlns:p14="http://schemas.microsoft.com/office/powerpoint/2010/main" val="3400438983"/>
       </p:ext>
     </p:extLst>
   </p:cSld>
@@ -13751,7 +13865,7 @@
           <p:cNvPr id="2" name="Title 1">
             <a:extLst>
               <a:ext uri="{FF2B5EF4-FFF2-40B4-BE49-F238E27FC236}">
-                <a16:creationId xmlns:a16="http://schemas.microsoft.com/office/drawing/2014/main" id="{57F3B0A4-BF7E-4369-AB50-4267A753BF11}"/>
+                <a16:creationId xmlns:a16="http://schemas.microsoft.com/office/drawing/2014/main" id="{55187534-4E9F-482B-8A6F-D5A18D99CA1C}"/>
               </a:ext>
             </a:extLst>
           </p:cNvPr>
@@ -13769,8 +13883,109 @@
           <a:p>
             <a:r>
               <a:rPr lang="en-US" dirty="0"/>
-              <a:t>API Example 1: http://open-notify.org/</a:t>
-            </a:r>
+              <a:t>Application Programming Interfaces (APIs)</a:t>
+            </a:r>
+          </a:p>
+        </p:txBody>
+      </p:sp>
+      <p:sp>
+        <p:nvSpPr>
+          <p:cNvPr id="3" name="Content Placeholder 2">
+            <a:extLst>
+              <a:ext uri="{FF2B5EF4-FFF2-40B4-BE49-F238E27FC236}">
+                <a16:creationId xmlns:a16="http://schemas.microsoft.com/office/drawing/2014/main" id="{F60E94FE-747D-48C9-AC8A-DB2D7766BA68}"/>
+              </a:ext>
+            </a:extLst>
+          </p:cNvPr>
+          <p:cNvSpPr>
+            <a:spLocks noGrp="1"/>
+          </p:cNvSpPr>
+          <p:nvPr>
+            <p:ph idx="1"/>
+          </p:nvPr>
+        </p:nvSpPr>
+        <p:spPr>
+          <a:xfrm>
+            <a:off x="609600" y="1774015"/>
+            <a:ext cx="10972800" cy="4702985"/>
+          </a:xfrm>
+        </p:spPr>
+        <p:txBody>
+          <a:bodyPr anchor="ctr"/>
+          <a:lstStyle/>
+          <a:p>
+            <a:r>
+              <a:rPr lang="en-US" dirty="0"/>
+              <a:t>How to use an API</a:t>
+            </a:r>
+          </a:p>
+          <a:p>
+            <a:pPr marL="971550" lvl="1" indent="-514350">
+              <a:buFont typeface="+mj-lt"/>
+              <a:buAutoNum type="arabicPeriod"/>
+            </a:pPr>
+            <a:r>
+              <a:rPr lang="en-US" dirty="0"/>
+              <a:t>Read the API documentation</a:t>
+            </a:r>
+          </a:p>
+          <a:p>
+            <a:pPr marL="971550" lvl="1" indent="-514350">
+              <a:buFont typeface="+mj-lt"/>
+              <a:buAutoNum type="arabicPeriod"/>
+            </a:pPr>
+            <a:r>
+              <a:rPr lang="en-US" dirty="0"/>
+              <a:t>Find the API endpoint</a:t>
+            </a:r>
+          </a:p>
+          <a:p>
+            <a:pPr marL="971550" lvl="1" indent="-514350">
+              <a:buFont typeface="+mj-lt"/>
+              <a:buAutoNum type="arabicPeriod"/>
+            </a:pPr>
+            <a:r>
+              <a:rPr lang="en-US" dirty="0"/>
+              <a:t>Explore the endpoint</a:t>
+            </a:r>
+          </a:p>
+          <a:p>
+            <a:pPr marL="1371600" lvl="2" indent="-514350"/>
+            <a:r>
+              <a:rPr lang="en-US" dirty="0"/>
+              <a:t>Start by trying a simple query in your web browser</a:t>
+            </a:r>
+          </a:p>
+          <a:p>
+            <a:pPr marL="971550" lvl="1" indent="-514350">
+              <a:buFont typeface="+mj-lt"/>
+              <a:buAutoNum type="arabicPeriod"/>
+            </a:pPr>
+            <a:r>
+              <a:rPr lang="en-US" dirty="0"/>
+              <a:t>Explore the API result</a:t>
+            </a:r>
+          </a:p>
+          <a:p>
+            <a:pPr marL="1371600" lvl="2" indent="-514350"/>
+            <a:r>
+              <a:rPr lang="en-US" dirty="0"/>
+              <a:t>JSON is a widely used data format. It consists of nested dictionaries and lists</a:t>
+            </a:r>
+          </a:p>
+          <a:p>
+            <a:pPr marL="971550" lvl="1" indent="-514350">
+              <a:buFont typeface="+mj-lt"/>
+              <a:buAutoNum type="arabicPeriod"/>
+            </a:pPr>
+            <a:r>
+              <a:rPr lang="en-US" dirty="0"/>
+              <a:t>Write code to send custom API requests</a:t>
+            </a:r>
+          </a:p>
+          <a:p>
+            <a:pPr marL="1371600" lvl="2" indent="-514350"/>
+            <a:endParaRPr lang="en-US" dirty="0"/>
           </a:p>
         </p:txBody>
       </p:sp>
@@ -13779,7 +13994,7 @@
           <p:cNvPr id="4" name="Date Placeholder 3">
             <a:extLst>
               <a:ext uri="{FF2B5EF4-FFF2-40B4-BE49-F238E27FC236}">
-                <a16:creationId xmlns:a16="http://schemas.microsoft.com/office/drawing/2014/main" id="{655AC432-702E-4E27-9A2D-421B517886B7}"/>
+                <a16:creationId xmlns:a16="http://schemas.microsoft.com/office/drawing/2014/main" id="{7672CD20-96D8-4963-9153-64437BC775C4}"/>
               </a:ext>
             </a:extLst>
           </p:cNvPr>
@@ -13798,7 +14013,7 @@
             <a:fld id="{D9AFFF4A-806C-EA44-A220-CFCF99192DAA}" type="datetime1">
               <a:rPr lang="en-US" smtClean="0"/>
               <a:pPr/>
-              <a:t>8/26/2022</a:t>
+              <a:t>2/9/2023</a:t>
             </a:fld>
             <a:endParaRPr lang="en-US" dirty="0"/>
           </a:p>
@@ -13809,7 +14024,7 @@
           <p:cNvPr id="5" name="Slide Number Placeholder 4">
             <a:extLst>
               <a:ext uri="{FF2B5EF4-FFF2-40B4-BE49-F238E27FC236}">
-                <a16:creationId xmlns:a16="http://schemas.microsoft.com/office/drawing/2014/main" id="{F83CB343-BF9D-4258-AE05-92023B52C8F8}"/>
+                <a16:creationId xmlns:a16="http://schemas.microsoft.com/office/drawing/2014/main" id="{D1642B32-CD33-481A-B5BF-8FBE9DE428E0}"/>
               </a:ext>
             </a:extLst>
           </p:cNvPr>
@@ -13829,6 +14044,124 @@
               <a:rPr lang="en-US" smtClean="0"/>
               <a:pPr/>
               <a:t>8</a:t>
+            </a:fld>
+            <a:endParaRPr lang="en-US" dirty="0"/>
+          </a:p>
+        </p:txBody>
+      </p:sp>
+    </p:spTree>
+    <p:extLst>
+      <p:ext uri="{BB962C8B-B14F-4D97-AF65-F5344CB8AC3E}">
+        <p14:creationId xmlns:p14="http://schemas.microsoft.com/office/powerpoint/2010/main" val="2744176874"/>
+      </p:ext>
+    </p:extLst>
+  </p:cSld>
+  <p:clrMapOvr>
+    <a:masterClrMapping/>
+  </p:clrMapOvr>
+</p:sld>
+</file>
+
+<file path=ppt/slides/slide9.xml><?xml version="1.0" encoding="utf-8"?>
+<p:sld xmlns:a="http://schemas.openxmlformats.org/drawingml/2006/main" xmlns:r="http://schemas.openxmlformats.org/officeDocument/2006/relationships" xmlns:p="http://schemas.openxmlformats.org/presentationml/2006/main">
+  <p:cSld>
+    <p:spTree>
+      <p:nvGrpSpPr>
+        <p:cNvPr id="1" name=""/>
+        <p:cNvGrpSpPr/>
+        <p:nvPr/>
+      </p:nvGrpSpPr>
+      <p:grpSpPr>
+        <a:xfrm>
+          <a:off x="0" y="0"/>
+          <a:ext cx="0" cy="0"/>
+          <a:chOff x="0" y="0"/>
+          <a:chExt cx="0" cy="0"/>
+        </a:xfrm>
+      </p:grpSpPr>
+      <p:sp>
+        <p:nvSpPr>
+          <p:cNvPr id="2" name="Title 1">
+            <a:extLst>
+              <a:ext uri="{FF2B5EF4-FFF2-40B4-BE49-F238E27FC236}">
+                <a16:creationId xmlns:a16="http://schemas.microsoft.com/office/drawing/2014/main" id="{57F3B0A4-BF7E-4369-AB50-4267A753BF11}"/>
+              </a:ext>
+            </a:extLst>
+          </p:cNvPr>
+          <p:cNvSpPr>
+            <a:spLocks noGrp="1"/>
+          </p:cNvSpPr>
+          <p:nvPr>
+            <p:ph type="title"/>
+          </p:nvPr>
+        </p:nvSpPr>
+        <p:spPr/>
+        <p:txBody>
+          <a:bodyPr/>
+          <a:lstStyle/>
+          <a:p>
+            <a:r>
+              <a:rPr lang="en-US" dirty="0"/>
+              <a:t>API Example 1: http://open-notify.org/</a:t>
+            </a:r>
+          </a:p>
+        </p:txBody>
+      </p:sp>
+      <p:sp>
+        <p:nvSpPr>
+          <p:cNvPr id="4" name="Date Placeholder 3">
+            <a:extLst>
+              <a:ext uri="{FF2B5EF4-FFF2-40B4-BE49-F238E27FC236}">
+                <a16:creationId xmlns:a16="http://schemas.microsoft.com/office/drawing/2014/main" id="{655AC432-702E-4E27-9A2D-421B517886B7}"/>
+              </a:ext>
+            </a:extLst>
+          </p:cNvPr>
+          <p:cNvSpPr>
+            <a:spLocks noGrp="1"/>
+          </p:cNvSpPr>
+          <p:nvPr>
+            <p:ph type="dt" sz="half" idx="10"/>
+          </p:nvPr>
+        </p:nvSpPr>
+        <p:spPr/>
+        <p:txBody>
+          <a:bodyPr/>
+          <a:lstStyle/>
+          <a:p>
+            <a:fld id="{D9AFFF4A-806C-EA44-A220-CFCF99192DAA}" type="datetime1">
+              <a:rPr lang="en-US" smtClean="0"/>
+              <a:pPr/>
+              <a:t>2/9/2023</a:t>
+            </a:fld>
+            <a:endParaRPr lang="en-US" dirty="0"/>
+          </a:p>
+        </p:txBody>
+      </p:sp>
+      <p:sp>
+        <p:nvSpPr>
+          <p:cNvPr id="5" name="Slide Number Placeholder 4">
+            <a:extLst>
+              <a:ext uri="{FF2B5EF4-FFF2-40B4-BE49-F238E27FC236}">
+                <a16:creationId xmlns:a16="http://schemas.microsoft.com/office/drawing/2014/main" id="{F83CB343-BF9D-4258-AE05-92023B52C8F8}"/>
+              </a:ext>
+            </a:extLst>
+          </p:cNvPr>
+          <p:cNvSpPr>
+            <a:spLocks noGrp="1"/>
+          </p:cNvSpPr>
+          <p:nvPr>
+            <p:ph type="sldNum" sz="quarter" idx="12"/>
+          </p:nvPr>
+        </p:nvSpPr>
+        <p:spPr/>
+        <p:txBody>
+          <a:bodyPr/>
+          <a:lstStyle/>
+          <a:p>
+            <a:fld id="{4FAB73BC-B049-4115-A692-8D63A059BFB8}" type="slidenum">
+              <a:rPr lang="en-US" smtClean="0"/>
+              <a:pPr/>
+              <a:t>9</a:t>
             </a:fld>
             <a:endParaRPr lang="en-US" dirty="0"/>
           </a:p>
@@ -14057,164 +14390,6 @@
     <p:extLst>
       <p:ext uri="{BB962C8B-B14F-4D97-AF65-F5344CB8AC3E}">
         <p14:creationId xmlns:p14="http://schemas.microsoft.com/office/powerpoint/2010/main" val="3352745347"/>
-      </p:ext>
-    </p:extLst>
-  </p:cSld>
-  <p:clrMapOvr>
-    <a:masterClrMapping/>
-  </p:clrMapOvr>
-</p:sld>
-</file>
-
-<file path=ppt/slides/slide9.xml><?xml version="1.0" encoding="utf-8"?>
-<p:sld xmlns:a="http://schemas.openxmlformats.org/drawingml/2006/main" xmlns:r="http://schemas.openxmlformats.org/officeDocument/2006/relationships" xmlns:p="http://schemas.openxmlformats.org/presentationml/2006/main">
-  <p:cSld>
-    <p:spTree>
-      <p:nvGrpSpPr>
-        <p:cNvPr id="1" name=""/>
-        <p:cNvGrpSpPr/>
-        <p:nvPr/>
-      </p:nvGrpSpPr>
-      <p:grpSpPr>
-        <a:xfrm>
-          <a:off x="0" y="0"/>
-          <a:ext cx="0" cy="0"/>
-          <a:chOff x="0" y="0"/>
-          <a:chExt cx="0" cy="0"/>
-        </a:xfrm>
-      </p:grpSpPr>
-      <p:sp>
-        <p:nvSpPr>
-          <p:cNvPr id="4" name="Date Placeholder 3">
-            <a:extLst>
-              <a:ext uri="{FF2B5EF4-FFF2-40B4-BE49-F238E27FC236}">
-                <a16:creationId xmlns:a16="http://schemas.microsoft.com/office/drawing/2014/main" id="{655AC432-702E-4E27-9A2D-421B517886B7}"/>
-              </a:ext>
-            </a:extLst>
-          </p:cNvPr>
-          <p:cNvSpPr>
-            <a:spLocks noGrp="1"/>
-          </p:cNvSpPr>
-          <p:nvPr>
-            <p:ph type="dt" sz="half" idx="10"/>
-          </p:nvPr>
-        </p:nvSpPr>
-        <p:spPr/>
-        <p:txBody>
-          <a:bodyPr/>
-          <a:lstStyle/>
-          <a:p>
-            <a:fld id="{D9AFFF4A-806C-EA44-A220-CFCF99192DAA}" type="datetime1">
-              <a:rPr lang="en-US" smtClean="0"/>
-              <a:pPr/>
-              <a:t>8/26/2022</a:t>
-            </a:fld>
-            <a:endParaRPr lang="en-US" dirty="0"/>
-          </a:p>
-        </p:txBody>
-      </p:sp>
-      <p:sp>
-        <p:nvSpPr>
-          <p:cNvPr id="5" name="Slide Number Placeholder 4">
-            <a:extLst>
-              <a:ext uri="{FF2B5EF4-FFF2-40B4-BE49-F238E27FC236}">
-                <a16:creationId xmlns:a16="http://schemas.microsoft.com/office/drawing/2014/main" id="{F83CB343-BF9D-4258-AE05-92023B52C8F8}"/>
-              </a:ext>
-            </a:extLst>
-          </p:cNvPr>
-          <p:cNvSpPr>
-            <a:spLocks noGrp="1"/>
-          </p:cNvSpPr>
-          <p:nvPr>
-            <p:ph type="sldNum" sz="quarter" idx="12"/>
-          </p:nvPr>
-        </p:nvSpPr>
-        <p:spPr/>
-        <p:txBody>
-          <a:bodyPr/>
-          <a:lstStyle/>
-          <a:p>
-            <a:fld id="{4FAB73BC-B049-4115-A692-8D63A059BFB8}" type="slidenum">
-              <a:rPr lang="en-US" smtClean="0"/>
-              <a:pPr/>
-              <a:t>9</a:t>
-            </a:fld>
-            <a:endParaRPr lang="en-US" dirty="0"/>
-          </a:p>
-        </p:txBody>
-      </p:sp>
-      <p:pic>
-        <p:nvPicPr>
-          <p:cNvPr id="8" name="Picture 7">
-            <a:extLst>
-              <a:ext uri="{FF2B5EF4-FFF2-40B4-BE49-F238E27FC236}">
-                <a16:creationId xmlns:a16="http://schemas.microsoft.com/office/drawing/2014/main" id="{38626BF0-108E-4CDB-AA77-B7D47F88098F}"/>
-              </a:ext>
-            </a:extLst>
-          </p:cNvPr>
-          <p:cNvPicPr>
-            <a:picLocks noChangeAspect="1"/>
-          </p:cNvPicPr>
-          <p:nvPr/>
-        </p:nvPicPr>
-        <p:blipFill>
-          <a:blip r:embed="rId2"/>
-          <a:stretch>
-            <a:fillRect/>
-          </a:stretch>
-        </p:blipFill>
-        <p:spPr>
-          <a:xfrm>
-            <a:off x="1223962" y="1676400"/>
-            <a:ext cx="9744075" cy="4591050"/>
-          </a:xfrm>
-          <a:prstGeom prst="rect">
-            <a:avLst/>
-          </a:prstGeom>
-          <a:ln>
-            <a:solidFill>
-              <a:schemeClr val="tx1"/>
-            </a:solidFill>
-          </a:ln>
-        </p:spPr>
-      </p:pic>
-      <p:sp>
-        <p:nvSpPr>
-          <p:cNvPr id="10" name="Title 1">
-            <a:extLst>
-              <a:ext uri="{FF2B5EF4-FFF2-40B4-BE49-F238E27FC236}">
-                <a16:creationId xmlns:a16="http://schemas.microsoft.com/office/drawing/2014/main" id="{5E0922C2-0DF7-4FD8-81A6-C7774B0EF3DF}"/>
-              </a:ext>
-            </a:extLst>
-          </p:cNvPr>
-          <p:cNvSpPr>
-            <a:spLocks noGrp="1"/>
-          </p:cNvSpPr>
-          <p:nvPr>
-            <p:ph type="title"/>
-          </p:nvPr>
-        </p:nvSpPr>
-        <p:spPr>
-          <a:xfrm>
-            <a:off x="609600" y="274638"/>
-            <a:ext cx="10972800" cy="1143000"/>
-          </a:xfrm>
-        </p:spPr>
-        <p:txBody>
-          <a:bodyPr/>
-          <a:lstStyle/>
-          <a:p>
-            <a:r>
-              <a:rPr lang="en-US" dirty="0"/>
-              <a:t>API Example 1: http://open-notify.org/</a:t>
-            </a:r>
-          </a:p>
-        </p:txBody>
-      </p:sp>
-    </p:spTree>
-    <p:extLst>
-      <p:ext uri="{BB962C8B-B14F-4D97-AF65-F5344CB8AC3E}">
-        <p14:creationId xmlns:p14="http://schemas.microsoft.com/office/powerpoint/2010/main" val="2310581136"/>
       </p:ext>
     </p:extLst>
   </p:cSld>

</xml_diff>

<commit_message>
Small updates in API presentation
</commit_message>
<xml_diff>
--- a/1-foundations/4-api-and-dataviz/Introduction to APIs.pptx
+++ b/1-foundations/4-api-and-dataviz/Introduction to APIs.pptx
@@ -242,7 +242,7 @@
           <a:p>
             <a:fld id="{E9435E0D-9C38-451D-A174-6B66EC3D272C}" type="datetimeFigureOut">
               <a:rPr lang="en-US" smtClean="0"/>
-              <a:t>2/9/2023</a:t>
+              <a:t>11/11/2023</a:t>
             </a:fld>
             <a:endParaRPr lang="en-US"/>
           </a:p>
@@ -419,7 +419,7 @@
           <a:p>
             <a:fld id="{B1C46BBB-769C-F640-B863-1BAFC25FDA47}" type="datetimeFigureOut">
               <a:rPr lang="en-US" smtClean="0"/>
-              <a:t>2/9/2023</a:t>
+              <a:t>11/11/2023</a:t>
             </a:fld>
             <a:endParaRPr lang="en-US"/>
           </a:p>
@@ -684,6 +684,90 @@
     </a:lvl9pPr>
   </p:notesStyle>
 </p:notesMaster>
+</file>
+
+<file path=ppt/notesSlides/notesSlide1.xml><?xml version="1.0" encoding="utf-8"?>
+<p:notes xmlns:a="http://schemas.openxmlformats.org/drawingml/2006/main" xmlns:r="http://schemas.openxmlformats.org/officeDocument/2006/relationships" xmlns:p="http://schemas.openxmlformats.org/presentationml/2006/main">
+  <p:cSld>
+    <p:spTree>
+      <p:nvGrpSpPr>
+        <p:cNvPr id="1" name=""/>
+        <p:cNvGrpSpPr/>
+        <p:nvPr/>
+      </p:nvGrpSpPr>
+      <p:grpSpPr>
+        <a:xfrm>
+          <a:off x="0" y="0"/>
+          <a:ext cx="0" cy="0"/>
+          <a:chOff x="0" y="0"/>
+          <a:chExt cx="0" cy="0"/>
+        </a:xfrm>
+      </p:grpSpPr>
+      <p:sp>
+        <p:nvSpPr>
+          <p:cNvPr id="2" name="Slide Image Placeholder 1"/>
+          <p:cNvSpPr>
+            <a:spLocks noGrp="1" noRot="1" noChangeAspect="1"/>
+          </p:cNvSpPr>
+          <p:nvPr>
+            <p:ph type="sldImg"/>
+          </p:nvPr>
+        </p:nvSpPr>
+        <p:spPr/>
+      </p:sp>
+      <p:sp>
+        <p:nvSpPr>
+          <p:cNvPr id="3" name="Notes Placeholder 2"/>
+          <p:cNvSpPr>
+            <a:spLocks noGrp="1"/>
+          </p:cNvSpPr>
+          <p:nvPr>
+            <p:ph type="body" idx="1"/>
+          </p:nvPr>
+        </p:nvSpPr>
+        <p:spPr/>
+        <p:txBody>
+          <a:bodyPr/>
+          <a:lstStyle/>
+          <a:p>
+            <a:endParaRPr lang="en-US" dirty="0"/>
+          </a:p>
+        </p:txBody>
+      </p:sp>
+      <p:sp>
+        <p:nvSpPr>
+          <p:cNvPr id="4" name="Slide Number Placeholder 3"/>
+          <p:cNvSpPr>
+            <a:spLocks noGrp="1"/>
+          </p:cNvSpPr>
+          <p:nvPr>
+            <p:ph type="sldNum" sz="quarter" idx="5"/>
+          </p:nvPr>
+        </p:nvSpPr>
+        <p:spPr/>
+        <p:txBody>
+          <a:bodyPr/>
+          <a:lstStyle/>
+          <a:p>
+            <a:fld id="{B7270247-B477-5F4F-9C46-993B49B75627}" type="slidenum">
+              <a:rPr lang="en-US" smtClean="0"/>
+              <a:t>10</a:t>
+            </a:fld>
+            <a:endParaRPr lang="en-US"/>
+          </a:p>
+        </p:txBody>
+      </p:sp>
+    </p:spTree>
+    <p:extLst>
+      <p:ext uri="{BB962C8B-B14F-4D97-AF65-F5344CB8AC3E}">
+        <p14:creationId xmlns:p14="http://schemas.microsoft.com/office/powerpoint/2010/main" val="621390007"/>
+      </p:ext>
+    </p:extLst>
+  </p:cSld>
+  <p:clrMapOvr>
+    <a:masterClrMapping/>
+  </p:clrMapOvr>
+</p:notes>
 </file>
 
 <file path=ppt/slideLayouts/slideLayout1.xml><?xml version="1.0" encoding="utf-8"?>
@@ -1107,7 +1191,7 @@
           <a:p>
             <a:fld id="{78BFC871-B6C1-4D4E-A315-E9B623D8EE7D}" type="datetime1">
               <a:rPr lang="en-US" smtClean="0"/>
-              <a:t>2/9/2023</a:t>
+              <a:t>11/11/2023</a:t>
             </a:fld>
             <a:endParaRPr lang="en-US"/>
           </a:p>
@@ -1980,7 +2064,7 @@
           <a:p>
             <a:fld id="{78BFC871-B6C1-4D4E-A315-E9B623D8EE7D}" type="datetime1">
               <a:rPr lang="en-US" smtClean="0"/>
-              <a:t>2/9/2023</a:t>
+              <a:t>11/11/2023</a:t>
             </a:fld>
             <a:endParaRPr lang="en-US"/>
           </a:p>
@@ -2236,7 +2320,7 @@
           <a:p>
             <a:fld id="{78BFC871-B6C1-4D4E-A315-E9B623D8EE7D}" type="datetime1">
               <a:rPr lang="en-US" smtClean="0"/>
-              <a:t>2/9/2023</a:t>
+              <a:t>11/11/2023</a:t>
             </a:fld>
             <a:endParaRPr lang="en-US"/>
           </a:p>
@@ -2747,7 +2831,7 @@
             <a:fld id="{D9AFFF4A-806C-EA44-A220-CFCF99192DAA}" type="datetime1">
               <a:rPr lang="en-US" smtClean="0"/>
               <a:pPr/>
-              <a:t>2/9/2023</a:t>
+              <a:t>11/11/2023</a:t>
             </a:fld>
             <a:endParaRPr lang="en-US" dirty="0"/>
           </a:p>
@@ -3158,7 +3242,7 @@
             <a:fld id="{D9AFFF4A-806C-EA44-A220-CFCF99192DAA}" type="datetime1">
               <a:rPr lang="en-US" smtClean="0"/>
               <a:pPr/>
-              <a:t>2/9/2023</a:t>
+              <a:t>11/11/2023</a:t>
             </a:fld>
             <a:endParaRPr lang="en-US" dirty="0"/>
           </a:p>
@@ -3263,7 +3347,7 @@
           <a:p>
             <a:fld id="{78BFC871-B6C1-4D4E-A315-E9B623D8EE7D}" type="datetime1">
               <a:rPr lang="en-US" smtClean="0"/>
-              <a:t>2/9/2023</a:t>
+              <a:t>11/11/2023</a:t>
             </a:fld>
             <a:endParaRPr lang="en-US"/>
           </a:p>
@@ -4715,7 +4799,7 @@
           <a:p>
             <a:fld id="{78BFC871-B6C1-4D4E-A315-E9B623D8EE7D}" type="datetime1">
               <a:rPr lang="en-US" smtClean="0"/>
-              <a:t>2/9/2023</a:t>
+              <a:t>11/11/2023</a:t>
             </a:fld>
             <a:endParaRPr lang="en-US"/>
           </a:p>
@@ -4882,7 +4966,7 @@
             <a:fld id="{D9AFFF4A-806C-EA44-A220-CFCF99192DAA}" type="datetime1">
               <a:rPr lang="en-US" smtClean="0"/>
               <a:pPr/>
-              <a:t>2/9/2023</a:t>
+              <a:t>11/11/2023</a:t>
             </a:fld>
             <a:endParaRPr lang="en-US" dirty="0"/>
           </a:p>
@@ -5989,7 +6073,7 @@
           <a:p>
             <a:fld id="{78BFC871-B6C1-4D4E-A315-E9B623D8EE7D}" type="datetime1">
               <a:rPr lang="en-US" smtClean="0"/>
-              <a:t>2/9/2023</a:t>
+              <a:t>11/11/2023</a:t>
             </a:fld>
             <a:endParaRPr lang="en-US"/>
           </a:p>
@@ -6427,16 +6511,16 @@
           <a:lstStyle/>
           <a:p>
             <a:r>
-              <a:rPr lang="en-US" dirty="0"/>
+              <a:rPr lang="en-US" sz="2000" dirty="0"/>
               <a:t>Gaurav Bhardwaj, Kristoffer </a:t>
             </a:r>
             <a:r>
-              <a:rPr lang="en-US" dirty="0" err="1"/>
+              <a:rPr lang="en-US" sz="2000" dirty="0" err="1"/>
               <a:t>Bjärkefur</a:t>
             </a:r>
             <a:r>
-              <a:rPr lang="en-US" dirty="0"/>
-              <a:t>, Wei Lu, Luis Eduardo San Martin</a:t>
+              <a:rPr lang="en-US" sz="2000" dirty="0"/>
+              <a:t>, Wei Lu, Robert Marty, Luis Eduardo San Martin</a:t>
             </a:r>
           </a:p>
           <a:p>
@@ -6458,7 +6542,7 @@
           <a:p>
             <a:r>
               <a:rPr lang="en-US" sz="1800" dirty="0"/>
-              <a:t>February 2023</a:t>
+              <a:t>December 2023</a:t>
             </a:r>
           </a:p>
         </p:txBody>
@@ -6547,7 +6631,7 @@
             <a:fld id="{D9AFFF4A-806C-EA44-A220-CFCF99192DAA}" type="datetime1">
               <a:rPr lang="en-US" smtClean="0"/>
               <a:pPr/>
-              <a:t>2/9/2023</a:t>
+              <a:t>11/11/2023</a:t>
             </a:fld>
             <a:endParaRPr lang="en-US" dirty="0"/>
           </a:p>
@@ -6598,7 +6682,7 @@
           <p:nvPr/>
         </p:nvPicPr>
         <p:blipFill>
-          <a:blip r:embed="rId2"/>
+          <a:blip r:embed="rId3"/>
           <a:stretch>
             <a:fillRect/>
           </a:stretch>
@@ -6705,7 +6789,7 @@
             <a:fld id="{D9AFFF4A-806C-EA44-A220-CFCF99192DAA}" type="datetime1">
               <a:rPr lang="en-US" smtClean="0"/>
               <a:pPr/>
-              <a:t>2/9/2023</a:t>
+              <a:t>11/11/2023</a:t>
             </a:fld>
             <a:endParaRPr lang="en-US" dirty="0"/>
           </a:p>
@@ -6892,7 +6976,7 @@
             <a:fld id="{D9AFFF4A-806C-EA44-A220-CFCF99192DAA}" type="datetime1">
               <a:rPr lang="en-US" smtClean="0"/>
               <a:pPr/>
-              <a:t>2/9/2023</a:t>
+              <a:t>11/11/2023</a:t>
             </a:fld>
             <a:endParaRPr lang="en-US" dirty="0"/>
           </a:p>
@@ -7071,7 +7155,7 @@
             <a:fld id="{D9AFFF4A-806C-EA44-A220-CFCF99192DAA}" type="datetime1">
               <a:rPr lang="en-US" smtClean="0"/>
               <a:pPr/>
-              <a:t>2/9/2023</a:t>
+              <a:t>11/11/2023</a:t>
             </a:fld>
             <a:endParaRPr lang="en-US" dirty="0"/>
           </a:p>
@@ -7297,7 +7381,7 @@
             <a:fld id="{D9AFFF4A-806C-EA44-A220-CFCF99192DAA}" type="datetime1">
               <a:rPr lang="en-US" smtClean="0"/>
               <a:pPr/>
-              <a:t>2/9/2023</a:t>
+              <a:t>11/11/2023</a:t>
             </a:fld>
             <a:endParaRPr lang="en-US" dirty="0"/>
           </a:p>
@@ -7568,7 +7652,7 @@
             <a:fld id="{D9AFFF4A-806C-EA44-A220-CFCF99192DAA}" type="datetime1">
               <a:rPr lang="en-US" smtClean="0"/>
               <a:pPr/>
-              <a:t>2/9/2023</a:t>
+              <a:t>11/11/2023</a:t>
             </a:fld>
             <a:endParaRPr lang="en-US" dirty="0"/>
           </a:p>
@@ -7772,7 +7856,7 @@
             <a:fld id="{D9AFFF4A-806C-EA44-A220-CFCF99192DAA}" type="datetime1">
               <a:rPr lang="en-US" smtClean="0"/>
               <a:pPr/>
-              <a:t>2/9/2023</a:t>
+              <a:t>11/11/2023</a:t>
             </a:fld>
             <a:endParaRPr lang="en-US" dirty="0"/>
           </a:p>
@@ -7890,7 +7974,24 @@
           <a:p>
             <a:r>
               <a:rPr lang="en-US" dirty="0"/>
+              <a:t>Now we’ll continue with the notebooks for this session</a:t>
+            </a:r>
+            <a:br>
+              <a:rPr lang="en-US" dirty="0"/>
+            </a:br>
+            <a:br>
+              <a:rPr lang="en-US" dirty="0"/>
+            </a:br>
+            <a:r>
+              <a:rPr lang="en-US" dirty="0"/>
               <a:t>Thank you!</a:t>
+            </a:r>
+            <a:br>
+              <a:rPr lang="en-US" dirty="0"/>
+            </a:br>
+            <a:r>
+              <a:rPr lang="en-US" dirty="0"/>
+              <a:t>Gracias!</a:t>
             </a:r>
           </a:p>
         </p:txBody>
@@ -8276,7 +8377,7 @@
                   <a:spcPts val="600"/>
                 </a:spcAft>
               </a:pPr>
-              <a:t>2/9/2023</a:t>
+              <a:t>11/11/2023</a:t>
             </a:fld>
             <a:endParaRPr lang="en-US" dirty="0"/>
           </a:p>
@@ -9171,7 +9272,7 @@
             <a:fld id="{D9AFFF4A-806C-EA44-A220-CFCF99192DAA}" type="datetime1">
               <a:rPr lang="en-US" smtClean="0"/>
               <a:pPr/>
-              <a:t>2/9/2023</a:t>
+              <a:t>11/11/2023</a:t>
             </a:fld>
             <a:endParaRPr lang="en-US" dirty="0"/>
           </a:p>
@@ -11129,7 +11230,7 @@
             <a:fld id="{D9AFFF4A-806C-EA44-A220-CFCF99192DAA}" type="datetime1">
               <a:rPr lang="en-US" smtClean="0"/>
               <a:pPr/>
-              <a:t>2/9/2023</a:t>
+              <a:t>11/11/2023</a:t>
             </a:fld>
             <a:endParaRPr lang="en-US" dirty="0"/>
           </a:p>
@@ -13620,7 +13721,7 @@
             <a:fld id="{D9AFFF4A-806C-EA44-A220-CFCF99192DAA}" type="datetime1">
               <a:rPr lang="en-US" smtClean="0"/>
               <a:pPr/>
-              <a:t>2/9/2023</a:t>
+              <a:t>11/11/2023</a:t>
             </a:fld>
             <a:endParaRPr lang="en-US" dirty="0"/>
           </a:p>
@@ -13794,7 +13895,7 @@
             <a:fld id="{D9AFFF4A-806C-EA44-A220-CFCF99192DAA}" type="datetime1">
               <a:rPr lang="en-US" smtClean="0"/>
               <a:pPr/>
-              <a:t>2/9/2023</a:t>
+              <a:t>11/11/2023</a:t>
             </a:fld>
             <a:endParaRPr lang="en-US" dirty="0"/>
           </a:p>
@@ -14013,7 +14114,7 @@
             <a:fld id="{D9AFFF4A-806C-EA44-A220-CFCF99192DAA}" type="datetime1">
               <a:rPr lang="en-US" smtClean="0"/>
               <a:pPr/>
-              <a:t>2/9/2023</a:t>
+              <a:t>11/11/2023</a:t>
             </a:fld>
             <a:endParaRPr lang="en-US" dirty="0"/>
           </a:p>
@@ -14131,7 +14232,7 @@
             <a:fld id="{D9AFFF4A-806C-EA44-A220-CFCF99192DAA}" type="datetime1">
               <a:rPr lang="en-US" smtClean="0"/>
               <a:pPr/>
-              <a:t>2/9/2023</a:t>
+              <a:t>11/11/2023</a:t>
             </a:fld>
             <a:endParaRPr lang="en-US" dirty="0"/>
           </a:p>

</xml_diff>

<commit_message>
updated API intro presentation
</commit_message>
<xml_diff>
--- a/1-foundations/4-api-and-dataviz/Introduction to APIs.pptx
+++ b/1-foundations/4-api-and-dataviz/Introduction to APIs.pptx
@@ -25,8 +25,8 @@
     <p:sldId id="374" r:id="rId13"/>
     <p:sldId id="375" r:id="rId14"/>
     <p:sldId id="376" r:id="rId15"/>
-    <p:sldId id="378" r:id="rId16"/>
-    <p:sldId id="377" r:id="rId17"/>
+    <p:sldId id="380" r:id="rId16"/>
+    <p:sldId id="378" r:id="rId17"/>
     <p:sldId id="339" r:id="rId18"/>
   </p:sldIdLst>
   <p:sldSz cx="12192000" cy="6858000"/>
@@ -242,7 +242,7 @@
           <a:p>
             <a:fld id="{E9435E0D-9C38-451D-A174-6B66EC3D272C}" type="datetimeFigureOut">
               <a:rPr lang="en-US" smtClean="0"/>
-              <a:t>11/11/2023</a:t>
+              <a:t>12/4/2023</a:t>
             </a:fld>
             <a:endParaRPr lang="en-US"/>
           </a:p>
@@ -419,7 +419,7 @@
           <a:p>
             <a:fld id="{B1C46BBB-769C-F640-B863-1BAFC25FDA47}" type="datetimeFigureOut">
               <a:rPr lang="en-US" smtClean="0"/>
-              <a:t>11/11/2023</a:t>
+              <a:t>12/4/2023</a:t>
             </a:fld>
             <a:endParaRPr lang="en-US"/>
           </a:p>
@@ -1191,7 +1191,7 @@
           <a:p>
             <a:fld id="{78BFC871-B6C1-4D4E-A315-E9B623D8EE7D}" type="datetime1">
               <a:rPr lang="en-US" smtClean="0"/>
-              <a:t>11/11/2023</a:t>
+              <a:t>12/4/2023</a:t>
             </a:fld>
             <a:endParaRPr lang="en-US"/>
           </a:p>
@@ -2064,7 +2064,7 @@
           <a:p>
             <a:fld id="{78BFC871-B6C1-4D4E-A315-E9B623D8EE7D}" type="datetime1">
               <a:rPr lang="en-US" smtClean="0"/>
-              <a:t>11/11/2023</a:t>
+              <a:t>12/4/2023</a:t>
             </a:fld>
             <a:endParaRPr lang="en-US"/>
           </a:p>
@@ -2320,7 +2320,7 @@
           <a:p>
             <a:fld id="{78BFC871-B6C1-4D4E-A315-E9B623D8EE7D}" type="datetime1">
               <a:rPr lang="en-US" smtClean="0"/>
-              <a:t>11/11/2023</a:t>
+              <a:t>12/4/2023</a:t>
             </a:fld>
             <a:endParaRPr lang="en-US"/>
           </a:p>
@@ -2831,7 +2831,7 @@
             <a:fld id="{D9AFFF4A-806C-EA44-A220-CFCF99192DAA}" type="datetime1">
               <a:rPr lang="en-US" smtClean="0"/>
               <a:pPr/>
-              <a:t>11/11/2023</a:t>
+              <a:t>12/4/2023</a:t>
             </a:fld>
             <a:endParaRPr lang="en-US" dirty="0"/>
           </a:p>
@@ -3242,7 +3242,7 @@
             <a:fld id="{D9AFFF4A-806C-EA44-A220-CFCF99192DAA}" type="datetime1">
               <a:rPr lang="en-US" smtClean="0"/>
               <a:pPr/>
-              <a:t>11/11/2023</a:t>
+              <a:t>12/4/2023</a:t>
             </a:fld>
             <a:endParaRPr lang="en-US" dirty="0"/>
           </a:p>
@@ -3347,7 +3347,7 @@
           <a:p>
             <a:fld id="{78BFC871-B6C1-4D4E-A315-E9B623D8EE7D}" type="datetime1">
               <a:rPr lang="en-US" smtClean="0"/>
-              <a:t>11/11/2023</a:t>
+              <a:t>12/4/2023</a:t>
             </a:fld>
             <a:endParaRPr lang="en-US"/>
           </a:p>
@@ -4799,7 +4799,7 @@
           <a:p>
             <a:fld id="{78BFC871-B6C1-4D4E-A315-E9B623D8EE7D}" type="datetime1">
               <a:rPr lang="en-US" smtClean="0"/>
-              <a:t>11/11/2023</a:t>
+              <a:t>12/4/2023</a:t>
             </a:fld>
             <a:endParaRPr lang="en-US"/>
           </a:p>
@@ -4966,7 +4966,7 @@
             <a:fld id="{D9AFFF4A-806C-EA44-A220-CFCF99192DAA}" type="datetime1">
               <a:rPr lang="en-US" smtClean="0"/>
               <a:pPr/>
-              <a:t>11/11/2023</a:t>
+              <a:t>12/4/2023</a:t>
             </a:fld>
             <a:endParaRPr lang="en-US" dirty="0"/>
           </a:p>
@@ -6073,7 +6073,7 @@
           <a:p>
             <a:fld id="{78BFC871-B6C1-4D4E-A315-E9B623D8EE7D}" type="datetime1">
               <a:rPr lang="en-US" smtClean="0"/>
-              <a:t>11/11/2023</a:t>
+              <a:t>12/4/2023</a:t>
             </a:fld>
             <a:endParaRPr lang="en-US"/>
           </a:p>
@@ -6475,14 +6475,14 @@
           <a:p>
             <a:r>
               <a:rPr lang="en-US" dirty="0"/>
-              <a:t>Session 4 - Introduction to APIs</a:t>
+              <a:t>Session 4 -  Introduction to APIs</a:t>
             </a:r>
             <a:br>
               <a:rPr lang="en-US" dirty="0"/>
             </a:br>
             <a:r>
               <a:rPr lang="en-US" sz="2800" b="0" dirty="0"/>
-              <a:t>Foundations of Python for Data Science</a:t>
+              <a:t>Python for Data Science</a:t>
             </a:r>
             <a:endParaRPr lang="en-US" b="0" dirty="0"/>
           </a:p>
@@ -6631,7 +6631,7 @@
             <a:fld id="{D9AFFF4A-806C-EA44-A220-CFCF99192DAA}" type="datetime1">
               <a:rPr lang="en-US" smtClean="0"/>
               <a:pPr/>
-              <a:t>11/11/2023</a:t>
+              <a:t>12/4/2023</a:t>
             </a:fld>
             <a:endParaRPr lang="en-US" dirty="0"/>
           </a:p>
@@ -6789,7 +6789,7 @@
             <a:fld id="{D9AFFF4A-806C-EA44-A220-CFCF99192DAA}" type="datetime1">
               <a:rPr lang="en-US" smtClean="0"/>
               <a:pPr/>
-              <a:t>11/11/2023</a:t>
+              <a:t>12/4/2023</a:t>
             </a:fld>
             <a:endParaRPr lang="en-US" dirty="0"/>
           </a:p>
@@ -6976,7 +6976,7 @@
             <a:fld id="{D9AFFF4A-806C-EA44-A220-CFCF99192DAA}" type="datetime1">
               <a:rPr lang="en-US" smtClean="0"/>
               <a:pPr/>
-              <a:t>11/11/2023</a:t>
+              <a:t>12/4/2023</a:t>
             </a:fld>
             <a:endParaRPr lang="en-US" dirty="0"/>
           </a:p>
@@ -7068,10 +7068,10 @@
       </p:sp>
       <p:pic>
         <p:nvPicPr>
-          <p:cNvPr id="8" name="Picture 7">
-            <a:extLst>
-              <a:ext uri="{FF2B5EF4-FFF2-40B4-BE49-F238E27FC236}">
-                <a16:creationId xmlns:a16="http://schemas.microsoft.com/office/drawing/2014/main" id="{38A12D0C-E9D0-4DEC-B473-71F036DAB2C9}"/>
+          <p:cNvPr id="7" name="Picture 6">
+            <a:extLst>
+              <a:ext uri="{FF2B5EF4-FFF2-40B4-BE49-F238E27FC236}">
+                <a16:creationId xmlns:a16="http://schemas.microsoft.com/office/drawing/2014/main" id="{FAA46DE8-D76E-D37E-AFBF-0E11399E1223}"/>
               </a:ext>
             </a:extLst>
           </p:cNvPr>
@@ -7088,17 +7088,12 @@
         </p:blipFill>
         <p:spPr>
           <a:xfrm>
-            <a:off x="1907336" y="3297716"/>
-            <a:ext cx="8379664" cy="3183184"/>
+            <a:off x="3009900" y="3234031"/>
+            <a:ext cx="6172200" cy="3073706"/>
           </a:xfrm>
           <a:prstGeom prst="rect">
             <a:avLst/>
           </a:prstGeom>
-          <a:ln>
-            <a:solidFill>
-              <a:schemeClr val="tx1"/>
-            </a:solidFill>
-          </a:ln>
         </p:spPr>
       </p:pic>
     </p:spTree>
@@ -7155,7 +7150,7 @@
             <a:fld id="{D9AFFF4A-806C-EA44-A220-CFCF99192DAA}" type="datetime1">
               <a:rPr lang="en-US" smtClean="0"/>
               <a:pPr/>
-              <a:t>11/11/2023</a:t>
+              <a:t>12/4/2023</a:t>
             </a:fld>
             <a:endParaRPr lang="en-US" dirty="0"/>
           </a:p>
@@ -7227,41 +7222,6 @@
           </a:p>
         </p:txBody>
       </p:sp>
-      <p:pic>
-        <p:nvPicPr>
-          <p:cNvPr id="10" name="Picture 9">
-            <a:extLst>
-              <a:ext uri="{FF2B5EF4-FFF2-40B4-BE49-F238E27FC236}">
-                <a16:creationId xmlns:a16="http://schemas.microsoft.com/office/drawing/2014/main" id="{F961CDDA-647B-4B49-B9DA-468EFF873FBD}"/>
-              </a:ext>
-            </a:extLst>
-          </p:cNvPr>
-          <p:cNvPicPr>
-            <a:picLocks noChangeAspect="1"/>
-          </p:cNvPicPr>
-          <p:nvPr/>
-        </p:nvPicPr>
-        <p:blipFill>
-          <a:blip r:embed="rId2"/>
-          <a:stretch>
-            <a:fillRect/>
-          </a:stretch>
-        </p:blipFill>
-        <p:spPr>
-          <a:xfrm>
-            <a:off x="485710" y="2991989"/>
-            <a:ext cx="11353800" cy="2395344"/>
-          </a:xfrm>
-          <a:prstGeom prst="rect">
-            <a:avLst/>
-          </a:prstGeom>
-          <a:ln>
-            <a:solidFill>
-              <a:schemeClr val="tx1"/>
-            </a:solidFill>
-          </a:ln>
-        </p:spPr>
-      </p:pic>
       <p:sp>
         <p:nvSpPr>
           <p:cNvPr id="11" name="Title 1">
@@ -7297,6 +7257,41 @@
           </a:p>
         </p:txBody>
       </p:sp>
+      <p:pic>
+        <p:nvPicPr>
+          <p:cNvPr id="6" name="Picture 5">
+            <a:extLst>
+              <a:ext uri="{FF2B5EF4-FFF2-40B4-BE49-F238E27FC236}">
+                <a16:creationId xmlns:a16="http://schemas.microsoft.com/office/drawing/2014/main" id="{5579C90E-6EF6-EF47-2133-0F2386D0F82D}"/>
+              </a:ext>
+            </a:extLst>
+          </p:cNvPr>
+          <p:cNvPicPr>
+            <a:picLocks noChangeAspect="1"/>
+          </p:cNvPicPr>
+          <p:nvPr/>
+        </p:nvPicPr>
+        <p:blipFill>
+          <a:blip r:embed="rId2"/>
+          <a:stretch>
+            <a:fillRect/>
+          </a:stretch>
+        </p:blipFill>
+        <p:spPr>
+          <a:xfrm>
+            <a:off x="1066800" y="2867025"/>
+            <a:ext cx="10058400" cy="2771775"/>
+          </a:xfrm>
+          <a:prstGeom prst="rect">
+            <a:avLst/>
+          </a:prstGeom>
+          <a:ln>
+            <a:solidFill>
+              <a:schemeClr val="tx1"/>
+            </a:solidFill>
+          </a:ln>
+        </p:spPr>
+      </p:pic>
     </p:spTree>
     <p:extLst>
       <p:ext uri="{BB962C8B-B14F-4D97-AF65-F5344CB8AC3E}">
@@ -7381,7 +7376,7 @@
             <a:fld id="{D9AFFF4A-806C-EA44-A220-CFCF99192DAA}" type="datetime1">
               <a:rPr lang="en-US" smtClean="0"/>
               <a:pPr/>
-              <a:t>11/11/2023</a:t>
+              <a:t>12/4/2023</a:t>
             </a:fld>
             <a:endParaRPr lang="en-US" dirty="0"/>
           </a:p>
@@ -7466,10 +7461,10 @@
       </p:sp>
       <p:pic>
         <p:nvPicPr>
-          <p:cNvPr id="10" name="Picture 9">
-            <a:extLst>
-              <a:ext uri="{FF2B5EF4-FFF2-40B4-BE49-F238E27FC236}">
-                <a16:creationId xmlns:a16="http://schemas.microsoft.com/office/drawing/2014/main" id="{F961CDDA-647B-4B49-B9DA-468EFF873FBD}"/>
+          <p:cNvPr id="8" name="Picture 7">
+            <a:extLst>
+              <a:ext uri="{FF2B5EF4-FFF2-40B4-BE49-F238E27FC236}">
+                <a16:creationId xmlns:a16="http://schemas.microsoft.com/office/drawing/2014/main" id="{0D013678-C0A4-B440-6AAE-76C5DDD9265E}"/>
               </a:ext>
             </a:extLst>
           </p:cNvPr>
@@ -7478,15 +7473,16 @@
           </p:cNvPicPr>
           <p:nvPr/>
         </p:nvPicPr>
-        <p:blipFill rotWithShape="1">
+        <p:blipFill>
           <a:blip r:embed="rId2"/>
-          <a:srcRect r="40519" b="63529"/>
-          <a:stretch/>
+          <a:stretch>
+            <a:fillRect/>
+          </a:stretch>
         </p:blipFill>
         <p:spPr>
           <a:xfrm>
-            <a:off x="485710" y="3352800"/>
-            <a:ext cx="11035848" cy="1427611"/>
+            <a:off x="1066800" y="3400425"/>
+            <a:ext cx="10058400" cy="2771775"/>
           </a:xfrm>
           <a:prstGeom prst="rect">
             <a:avLst/>
@@ -7498,76 +7494,6 @@
           </a:ln>
         </p:spPr>
       </p:pic>
-      <p:sp>
-        <p:nvSpPr>
-          <p:cNvPr id="7" name="TextBox 6">
-            <a:extLst>
-              <a:ext uri="{FF2B5EF4-FFF2-40B4-BE49-F238E27FC236}">
-                <a16:creationId xmlns:a16="http://schemas.microsoft.com/office/drawing/2014/main" id="{602FBB9C-3228-4B42-AB0C-E2C6EB74A69C}"/>
-              </a:ext>
-            </a:extLst>
-          </p:cNvPr>
-          <p:cNvSpPr txBox="1"/>
-          <p:nvPr/>
-        </p:nvSpPr>
-        <p:spPr>
-          <a:xfrm>
-            <a:off x="609600" y="4951274"/>
-            <a:ext cx="10972800" cy="1938992"/>
-          </a:xfrm>
-          <a:prstGeom prst="rect">
-            <a:avLst/>
-          </a:prstGeom>
-          <a:noFill/>
-        </p:spPr>
-        <p:txBody>
-          <a:bodyPr wrap="square" rtlCol="0" anchor="ctr">
-            <a:spAutoFit/>
-          </a:bodyPr>
-          <a:lstStyle/>
-          <a:p>
-            <a:pPr marL="342900" indent="-342900" defTabSz="274320">
-              <a:buFont typeface="Arial" panose="020B0604020202020204" pitchFamily="34" charset="0"/>
-              <a:buChar char="•"/>
-            </a:pPr>
-            <a:r>
-              <a:rPr lang="en-US" sz="2400" dirty="0"/>
-              <a:t>Colombia national boundaries: </a:t>
-            </a:r>
-            <a:r>
-              <a:rPr lang="en-US" sz="2400" dirty="0">
-                <a:hlinkClick r:id="rId3"/>
-              </a:rPr>
-              <a:t>https://www.geoboundaries.org/api/current/gbOpen/COL/ADM0/</a:t>
-            </a:r>
-            <a:endParaRPr lang="en-US" sz="2400" dirty="0"/>
-          </a:p>
-          <a:p>
-            <a:pPr marL="342900" indent="-342900" defTabSz="274320">
-              <a:buFont typeface="Arial" panose="020B0604020202020204" pitchFamily="34" charset="0"/>
-              <a:buChar char="•"/>
-            </a:pPr>
-            <a:r>
-              <a:rPr lang="en-US" sz="2400" dirty="0"/>
-              <a:t>Pakistan first-level administrative boundaries: </a:t>
-            </a:r>
-            <a:r>
-              <a:rPr lang="en-US" sz="2400" dirty="0">
-                <a:hlinkClick r:id="rId4"/>
-              </a:rPr>
-              <a:t>https://www.geoboundaries.org/api/current/gbOpen/PAK/ADM1/</a:t>
-            </a:r>
-            <a:endParaRPr lang="en-US" sz="2400" dirty="0"/>
-          </a:p>
-          <a:p>
-            <a:pPr marL="342900" indent="-342900" defTabSz="274320">
-              <a:buFont typeface="Arial" panose="020B0604020202020204" pitchFamily="34" charset="0"/>
-              <a:buChar char="•"/>
-            </a:pPr>
-            <a:endParaRPr lang="en-US" sz="2400" dirty="0"/>
-          </a:p>
-        </p:txBody>
-      </p:sp>
     </p:spTree>
     <p:extLst>
       <p:ext uri="{BB962C8B-B14F-4D97-AF65-F5344CB8AC3E}">
@@ -7623,7 +7549,7 @@
           <a:p>
             <a:r>
               <a:rPr lang="en-US" dirty="0"/>
-              <a:t>Exploring API results</a:t>
+              <a:t>Custom API calls</a:t>
             </a:r>
           </a:p>
         </p:txBody>
@@ -7652,7 +7578,7 @@
             <a:fld id="{D9AFFF4A-806C-EA44-A220-CFCF99192DAA}" type="datetime1">
               <a:rPr lang="en-US" smtClean="0"/>
               <a:pPr/>
-              <a:t>11/11/2023</a:t>
+              <a:t>12/4/2023</a:t>
             </a:fld>
             <a:endParaRPr lang="en-US" dirty="0"/>
           </a:p>
@@ -7690,10 +7616,10 @@
       </p:sp>
       <p:sp>
         <p:nvSpPr>
-          <p:cNvPr id="3" name="TextBox 2">
-            <a:extLst>
-              <a:ext uri="{FF2B5EF4-FFF2-40B4-BE49-F238E27FC236}">
-                <a16:creationId xmlns:a16="http://schemas.microsoft.com/office/drawing/2014/main" id="{3933C386-576C-4EF6-9FC1-49E7A62F659B}"/>
+          <p:cNvPr id="7" name="TextBox 6">
+            <a:extLst>
+              <a:ext uri="{FF2B5EF4-FFF2-40B4-BE49-F238E27FC236}">
+                <a16:creationId xmlns:a16="http://schemas.microsoft.com/office/drawing/2014/main" id="{602FBB9C-3228-4B42-AB0C-E2C6EB74A69C}"/>
               </a:ext>
             </a:extLst>
           </p:cNvPr>
@@ -7702,8 +7628,8 @@
         </p:nvSpPr>
         <p:spPr>
           <a:xfrm>
-            <a:off x="609600" y="1912203"/>
-            <a:ext cx="10972800" cy="830997"/>
+            <a:off x="609600" y="4951274"/>
+            <a:ext cx="10972800" cy="1938992"/>
           </a:xfrm>
           <a:prstGeom prst="rect">
             <a:avLst/>
@@ -7722,8 +7648,15 @@
             </a:pPr>
             <a:r>
               <a:rPr lang="en-US" sz="2400" dirty="0"/>
-              <a:t>Many APIs will return extra information and metadata we don’t always need</a:t>
-            </a:r>
+              <a:t>Colombia national boundaries: </a:t>
+            </a:r>
+            <a:r>
+              <a:rPr lang="en-US" sz="2400" dirty="0">
+                <a:hlinkClick r:id="rId2"/>
+              </a:rPr>
+              <a:t>https://www.geoboundaries.org/api/current/gbOpen/COL/ADM0/</a:t>
+            </a:r>
+            <a:endParaRPr lang="en-US" sz="2400" dirty="0"/>
           </a:p>
           <a:p>
             <a:pPr marL="342900" indent="-342900" defTabSz="274320">
@@ -7732,8 +7665,22 @@
             </a:pPr>
             <a:r>
               <a:rPr lang="en-US" sz="2400" dirty="0"/>
-              <a:t>You should explore the returning JSON to locate relevant information and data</a:t>
-            </a:r>
+              <a:t>Pakistan first-level administrative boundaries: </a:t>
+            </a:r>
+            <a:r>
+              <a:rPr lang="en-US" sz="2400" dirty="0">
+                <a:hlinkClick r:id="rId3"/>
+              </a:rPr>
+              <a:t>https://www.geoboundaries.org/api/current/gbOpen/PAK/ADM1/</a:t>
+            </a:r>
+            <a:endParaRPr lang="en-US" sz="2400" dirty="0"/>
+          </a:p>
+          <a:p>
+            <a:pPr marL="342900" indent="-342900" defTabSz="274320">
+              <a:buFont typeface="Arial" panose="020B0604020202020204" pitchFamily="34" charset="0"/>
+              <a:buChar char="•"/>
+            </a:pPr>
+            <a:endParaRPr lang="en-US" sz="2400" dirty="0"/>
           </a:p>
         </p:txBody>
       </p:sp>
@@ -7742,7 +7689,7 @@
           <p:cNvPr id="8" name="Picture 7">
             <a:extLst>
               <a:ext uri="{FF2B5EF4-FFF2-40B4-BE49-F238E27FC236}">
-                <a16:creationId xmlns:a16="http://schemas.microsoft.com/office/drawing/2014/main" id="{350095AB-B1AA-4AE2-A628-8BE0855B3A52}"/>
+                <a16:creationId xmlns:a16="http://schemas.microsoft.com/office/drawing/2014/main" id="{480EE8E1-88DF-2C05-3FE9-59374FF32B30}"/>
               </a:ext>
             </a:extLst>
           </p:cNvPr>
@@ -7752,15 +7699,15 @@
           <p:nvPr/>
         </p:nvPicPr>
         <p:blipFill>
-          <a:blip r:embed="rId2"/>
+          <a:blip r:embed="rId4"/>
           <a:stretch>
             <a:fillRect/>
           </a:stretch>
         </p:blipFill>
         <p:spPr>
           <a:xfrm>
-            <a:off x="2438400" y="3038940"/>
-            <a:ext cx="7010400" cy="3438287"/>
+            <a:off x="1066800" y="1800225"/>
+            <a:ext cx="10058400" cy="2771775"/>
           </a:xfrm>
           <a:prstGeom prst="rect">
             <a:avLst/>
@@ -7775,7 +7722,7 @@
     </p:spTree>
     <p:extLst>
       <p:ext uri="{BB962C8B-B14F-4D97-AF65-F5344CB8AC3E}">
-        <p14:creationId xmlns:p14="http://schemas.microsoft.com/office/powerpoint/2010/main" val="3869550545"/>
+        <p14:creationId xmlns:p14="http://schemas.microsoft.com/office/powerpoint/2010/main" val="2882581043"/>
       </p:ext>
     </p:extLst>
   </p:cSld>
@@ -7856,7 +7803,7 @@
             <a:fld id="{D9AFFF4A-806C-EA44-A220-CFCF99192DAA}" type="datetime1">
               <a:rPr lang="en-US" smtClean="0"/>
               <a:pPr/>
-              <a:t>11/11/2023</a:t>
+              <a:t>12/4/2023</a:t>
             </a:fld>
             <a:endParaRPr lang="en-US" dirty="0"/>
           </a:p>
@@ -7892,12 +7839,61 @@
           </a:p>
         </p:txBody>
       </p:sp>
+      <p:sp>
+        <p:nvSpPr>
+          <p:cNvPr id="3" name="TextBox 2">
+            <a:extLst>
+              <a:ext uri="{FF2B5EF4-FFF2-40B4-BE49-F238E27FC236}">
+                <a16:creationId xmlns:a16="http://schemas.microsoft.com/office/drawing/2014/main" id="{3933C386-576C-4EF6-9FC1-49E7A62F659B}"/>
+              </a:ext>
+            </a:extLst>
+          </p:cNvPr>
+          <p:cNvSpPr txBox="1"/>
+          <p:nvPr/>
+        </p:nvSpPr>
+        <p:spPr>
+          <a:xfrm>
+            <a:off x="609600" y="1912203"/>
+            <a:ext cx="10972800" cy="830997"/>
+          </a:xfrm>
+          <a:prstGeom prst="rect">
+            <a:avLst/>
+          </a:prstGeom>
+          <a:noFill/>
+        </p:spPr>
+        <p:txBody>
+          <a:bodyPr wrap="square" rtlCol="0" anchor="ctr">
+            <a:spAutoFit/>
+          </a:bodyPr>
+          <a:lstStyle/>
+          <a:p>
+            <a:pPr marL="342900" indent="-342900" defTabSz="274320">
+              <a:buFont typeface="Arial" panose="020B0604020202020204" pitchFamily="34" charset="0"/>
+              <a:buChar char="•"/>
+            </a:pPr>
+            <a:r>
+              <a:rPr lang="en-US" sz="2400" dirty="0"/>
+              <a:t>Many APIs will return extra information and metadata we don’t always need</a:t>
+            </a:r>
+          </a:p>
+          <a:p>
+            <a:pPr marL="342900" indent="-342900" defTabSz="274320">
+              <a:buFont typeface="Arial" panose="020B0604020202020204" pitchFamily="34" charset="0"/>
+              <a:buChar char="•"/>
+            </a:pPr>
+            <a:r>
+              <a:rPr lang="en-US" sz="2400" dirty="0"/>
+              <a:t>You should explore the returning JSON to locate relevant information and data</a:t>
+            </a:r>
+          </a:p>
+        </p:txBody>
+      </p:sp>
       <p:pic>
         <p:nvPicPr>
-          <p:cNvPr id="11" name="Picture 10">
-            <a:extLst>
-              <a:ext uri="{FF2B5EF4-FFF2-40B4-BE49-F238E27FC236}">
-                <a16:creationId xmlns:a16="http://schemas.microsoft.com/office/drawing/2014/main" id="{1DB03CDB-A421-4F45-B724-A87E08457843}"/>
+          <p:cNvPr id="7" name="Picture 6">
+            <a:extLst>
+              <a:ext uri="{FF2B5EF4-FFF2-40B4-BE49-F238E27FC236}">
+                <a16:creationId xmlns:a16="http://schemas.microsoft.com/office/drawing/2014/main" id="{0F3E9AAA-09ED-DBC7-1D78-561B3080AE35}"/>
               </a:ext>
             </a:extLst>
           </p:cNvPr>
@@ -7914,8 +7910,8 @@
         </p:blipFill>
         <p:spPr>
           <a:xfrm>
-            <a:off x="1542010" y="1752600"/>
-            <a:ext cx="9107980" cy="4567326"/>
+            <a:off x="2705100" y="2980306"/>
+            <a:ext cx="6781800" cy="3603056"/>
           </a:xfrm>
           <a:prstGeom prst="rect">
             <a:avLst/>
@@ -7930,7 +7926,7 @@
     </p:spTree>
     <p:extLst>
       <p:ext uri="{BB962C8B-B14F-4D97-AF65-F5344CB8AC3E}">
-        <p14:creationId xmlns:p14="http://schemas.microsoft.com/office/powerpoint/2010/main" val="2668021021"/>
+        <p14:creationId xmlns:p14="http://schemas.microsoft.com/office/powerpoint/2010/main" val="3869550545"/>
       </p:ext>
     </p:extLst>
   </p:cSld>
@@ -8377,7 +8373,7 @@
                   <a:spcPts val="600"/>
                 </a:spcAft>
               </a:pPr>
-              <a:t>11/11/2023</a:t>
+              <a:t>12/4/2023</a:t>
             </a:fld>
             <a:endParaRPr lang="en-US" dirty="0"/>
           </a:p>
@@ -8624,7 +8620,7 @@
                   <a:schemeClr val="tx1"/>
                 </a:solidFill>
               </a:rPr>
-              <a:t>I am a chef and I have plenty off food to offer</a:t>
+              <a:t>I am a chef and I have plenty of food to offer</a:t>
             </a:r>
           </a:p>
         </p:txBody>
@@ -9272,7 +9268,7 @@
             <a:fld id="{D9AFFF4A-806C-EA44-A220-CFCF99192DAA}" type="datetime1">
               <a:rPr lang="en-US" smtClean="0"/>
               <a:pPr/>
-              <a:t>11/11/2023</a:t>
+              <a:t>12/4/2023</a:t>
             </a:fld>
             <a:endParaRPr lang="en-US" dirty="0"/>
           </a:p>
@@ -11230,7 +11226,7 @@
             <a:fld id="{D9AFFF4A-806C-EA44-A220-CFCF99192DAA}" type="datetime1">
               <a:rPr lang="en-US" smtClean="0"/>
               <a:pPr/>
-              <a:t>11/11/2023</a:t>
+              <a:t>12/4/2023</a:t>
             </a:fld>
             <a:endParaRPr lang="en-US" dirty="0"/>
           </a:p>
@@ -13692,7 +13688,7 @@
           <a:p>
             <a:r>
               <a:rPr lang="en-US" dirty="0"/>
-              <a:t>In data science, these interactions are mostly used to retrieve data from data bases</a:t>
+              <a:t>In data science, these interactions are often used to retrieve data from data bases</a:t>
             </a:r>
           </a:p>
         </p:txBody>
@@ -13721,7 +13717,7 @@
             <a:fld id="{D9AFFF4A-806C-EA44-A220-CFCF99192DAA}" type="datetime1">
               <a:rPr lang="en-US" smtClean="0"/>
               <a:pPr/>
-              <a:t>11/11/2023</a:t>
+              <a:t>12/4/2023</a:t>
             </a:fld>
             <a:endParaRPr lang="en-US" dirty="0"/>
           </a:p>
@@ -13866,7 +13862,7 @@
             <a:pPr lvl="1"/>
             <a:r>
               <a:rPr lang="en-US" dirty="0"/>
-              <a:t>Allows to run code on the most recent data available</a:t>
+              <a:t>Allows to run code on the most recent data available or to update data seamlessly</a:t>
             </a:r>
           </a:p>
         </p:txBody>
@@ -13895,7 +13891,7 @@
             <a:fld id="{D9AFFF4A-806C-EA44-A220-CFCF99192DAA}" type="datetime1">
               <a:rPr lang="en-US" smtClean="0"/>
               <a:pPr/>
-              <a:t>11/11/2023</a:t>
+              <a:t>12/4/2023</a:t>
             </a:fld>
             <a:endParaRPr lang="en-US" dirty="0"/>
           </a:p>
@@ -14114,7 +14110,7 @@
             <a:fld id="{D9AFFF4A-806C-EA44-A220-CFCF99192DAA}" type="datetime1">
               <a:rPr lang="en-US" smtClean="0"/>
               <a:pPr/>
-              <a:t>11/11/2023</a:t>
+              <a:t>12/4/2023</a:t>
             </a:fld>
             <a:endParaRPr lang="en-US" dirty="0"/>
           </a:p>
@@ -14232,7 +14228,7 @@
             <a:fld id="{D9AFFF4A-806C-EA44-A220-CFCF99192DAA}" type="datetime1">
               <a:rPr lang="en-US" smtClean="0"/>
               <a:pPr/>
-              <a:t>11/11/2023</a:t>
+              <a:t>12/4/2023</a:t>
             </a:fld>
             <a:endParaRPr lang="en-US" dirty="0"/>
           </a:p>

</xml_diff>

<commit_message>
update of APIs session
</commit_message>
<xml_diff>
--- a/1-foundations/4-api-and-dataviz/Introduction to APIs.pptx
+++ b/1-foundations/4-api-and-dataviz/Introduction to APIs.pptx
@@ -242,7 +242,7 @@
           <a:p>
             <a:fld id="{E9435E0D-9C38-451D-A174-6B66EC3D272C}" type="datetimeFigureOut">
               <a:rPr lang="en-US" smtClean="0"/>
-              <a:t>12/4/2023</a:t>
+              <a:t>12/11/2024</a:t>
             </a:fld>
             <a:endParaRPr lang="en-US"/>
           </a:p>
@@ -419,7 +419,7 @@
           <a:p>
             <a:fld id="{B1C46BBB-769C-F640-B863-1BAFC25FDA47}" type="datetimeFigureOut">
               <a:rPr lang="en-US" smtClean="0"/>
-              <a:t>12/4/2023</a:t>
+              <a:t>12/11/2024</a:t>
             </a:fld>
             <a:endParaRPr lang="en-US"/>
           </a:p>
@@ -1191,7 +1191,7 @@
           <a:p>
             <a:fld id="{78BFC871-B6C1-4D4E-A315-E9B623D8EE7D}" type="datetime1">
               <a:rPr lang="en-US" smtClean="0"/>
-              <a:t>12/4/2023</a:t>
+              <a:t>12/11/2024</a:t>
             </a:fld>
             <a:endParaRPr lang="en-US"/>
           </a:p>
@@ -2064,7 +2064,7 @@
           <a:p>
             <a:fld id="{78BFC871-B6C1-4D4E-A315-E9B623D8EE7D}" type="datetime1">
               <a:rPr lang="en-US" smtClean="0"/>
-              <a:t>12/4/2023</a:t>
+              <a:t>12/11/2024</a:t>
             </a:fld>
             <a:endParaRPr lang="en-US"/>
           </a:p>
@@ -2320,7 +2320,7 @@
           <a:p>
             <a:fld id="{78BFC871-B6C1-4D4E-A315-E9B623D8EE7D}" type="datetime1">
               <a:rPr lang="en-US" smtClean="0"/>
-              <a:t>12/4/2023</a:t>
+              <a:t>12/11/2024</a:t>
             </a:fld>
             <a:endParaRPr lang="en-US"/>
           </a:p>
@@ -2831,7 +2831,7 @@
             <a:fld id="{D9AFFF4A-806C-EA44-A220-CFCF99192DAA}" type="datetime1">
               <a:rPr lang="en-US" smtClean="0"/>
               <a:pPr/>
-              <a:t>12/4/2023</a:t>
+              <a:t>12/11/2024</a:t>
             </a:fld>
             <a:endParaRPr lang="en-US" dirty="0"/>
           </a:p>
@@ -3242,7 +3242,7 @@
             <a:fld id="{D9AFFF4A-806C-EA44-A220-CFCF99192DAA}" type="datetime1">
               <a:rPr lang="en-US" smtClean="0"/>
               <a:pPr/>
-              <a:t>12/4/2023</a:t>
+              <a:t>12/11/2024</a:t>
             </a:fld>
             <a:endParaRPr lang="en-US" dirty="0"/>
           </a:p>
@@ -3347,7 +3347,7 @@
           <a:p>
             <a:fld id="{78BFC871-B6C1-4D4E-A315-E9B623D8EE7D}" type="datetime1">
               <a:rPr lang="en-US" smtClean="0"/>
-              <a:t>12/4/2023</a:t>
+              <a:t>12/11/2024</a:t>
             </a:fld>
             <a:endParaRPr lang="en-US"/>
           </a:p>
@@ -4799,7 +4799,7 @@
           <a:p>
             <a:fld id="{78BFC871-B6C1-4D4E-A315-E9B623D8EE7D}" type="datetime1">
               <a:rPr lang="en-US" smtClean="0"/>
-              <a:t>12/4/2023</a:t>
+              <a:t>12/11/2024</a:t>
             </a:fld>
             <a:endParaRPr lang="en-US"/>
           </a:p>
@@ -4966,7 +4966,7 @@
             <a:fld id="{D9AFFF4A-806C-EA44-A220-CFCF99192DAA}" type="datetime1">
               <a:rPr lang="en-US" smtClean="0"/>
               <a:pPr/>
-              <a:t>12/4/2023</a:t>
+              <a:t>12/11/2024</a:t>
             </a:fld>
             <a:endParaRPr lang="en-US" dirty="0"/>
           </a:p>
@@ -6073,7 +6073,7 @@
           <a:p>
             <a:fld id="{78BFC871-B6C1-4D4E-A315-E9B623D8EE7D}" type="datetime1">
               <a:rPr lang="en-US" smtClean="0"/>
-              <a:t>12/4/2023</a:t>
+              <a:t>12/11/2024</a:t>
             </a:fld>
             <a:endParaRPr lang="en-US"/>
           </a:p>
@@ -6511,23 +6511,6 @@
           <a:lstStyle/>
           <a:p>
             <a:r>
-              <a:rPr lang="en-US" sz="2000" dirty="0"/>
-              <a:t>Gaurav Bhardwaj, Kristoffer </a:t>
-            </a:r>
-            <a:r>
-              <a:rPr lang="en-US" sz="2000" dirty="0" err="1"/>
-              <a:t>Bjärkefur</a:t>
-            </a:r>
-            <a:r>
-              <a:rPr lang="en-US" sz="2000" dirty="0"/>
-              <a:t>, Wei Lu, Robert Marty, Luis Eduardo San Martin</a:t>
-            </a:r>
-          </a:p>
-          <a:p>
-            <a:endParaRPr lang="en-US" i="1" u="sng" dirty="0"/>
-          </a:p>
-          <a:p>
-            <a:r>
               <a:rPr lang="en-US" sz="1800" dirty="0"/>
               <a:t>The World Bank | </a:t>
             </a:r>
@@ -6535,15 +6518,9 @@
               <a:rPr lang="en-US" sz="1800" dirty="0">
                 <a:hlinkClick r:id="rId2"/>
               </a:rPr>
-              <a:t>WB GitHub</a:t>
+              <a:t>Course GitHub repository</a:t>
             </a:r>
             <a:endParaRPr lang="en-US" sz="1800" dirty="0"/>
-          </a:p>
-          <a:p>
-            <a:r>
-              <a:rPr lang="en-US" sz="1800" dirty="0"/>
-              <a:t>December 2023</a:t>
-            </a:r>
           </a:p>
         </p:txBody>
       </p:sp>
@@ -6609,36 +6586,6 @@
       </p:grpSpPr>
       <p:sp>
         <p:nvSpPr>
-          <p:cNvPr id="4" name="Date Placeholder 3">
-            <a:extLst>
-              <a:ext uri="{FF2B5EF4-FFF2-40B4-BE49-F238E27FC236}">
-                <a16:creationId xmlns:a16="http://schemas.microsoft.com/office/drawing/2014/main" id="{655AC432-702E-4E27-9A2D-421B517886B7}"/>
-              </a:ext>
-            </a:extLst>
-          </p:cNvPr>
-          <p:cNvSpPr>
-            <a:spLocks noGrp="1"/>
-          </p:cNvSpPr>
-          <p:nvPr>
-            <p:ph type="dt" sz="half" idx="10"/>
-          </p:nvPr>
-        </p:nvSpPr>
-        <p:spPr/>
-        <p:txBody>
-          <a:bodyPr/>
-          <a:lstStyle/>
-          <a:p>
-            <a:fld id="{D9AFFF4A-806C-EA44-A220-CFCF99192DAA}" type="datetime1">
-              <a:rPr lang="en-US" smtClean="0"/>
-              <a:pPr/>
-              <a:t>12/4/2023</a:t>
-            </a:fld>
-            <a:endParaRPr lang="en-US" dirty="0"/>
-          </a:p>
-        </p:txBody>
-      </p:sp>
-      <p:sp>
-        <p:nvSpPr>
           <p:cNvPr id="5" name="Slide Number Placeholder 4">
             <a:extLst>
               <a:ext uri="{FF2B5EF4-FFF2-40B4-BE49-F238E27FC236}">
@@ -6765,36 +6712,6 @@
           <a:chExt cx="0" cy="0"/>
         </a:xfrm>
       </p:grpSpPr>
-      <p:sp>
-        <p:nvSpPr>
-          <p:cNvPr id="4" name="Date Placeholder 3">
-            <a:extLst>
-              <a:ext uri="{FF2B5EF4-FFF2-40B4-BE49-F238E27FC236}">
-                <a16:creationId xmlns:a16="http://schemas.microsoft.com/office/drawing/2014/main" id="{655AC432-702E-4E27-9A2D-421B517886B7}"/>
-              </a:ext>
-            </a:extLst>
-          </p:cNvPr>
-          <p:cNvSpPr>
-            <a:spLocks noGrp="1"/>
-          </p:cNvSpPr>
-          <p:nvPr>
-            <p:ph type="dt" sz="half" idx="10"/>
-          </p:nvPr>
-        </p:nvSpPr>
-        <p:spPr/>
-        <p:txBody>
-          <a:bodyPr/>
-          <a:lstStyle/>
-          <a:p>
-            <a:fld id="{D9AFFF4A-806C-EA44-A220-CFCF99192DAA}" type="datetime1">
-              <a:rPr lang="en-US" smtClean="0"/>
-              <a:pPr/>
-              <a:t>12/4/2023</a:t>
-            </a:fld>
-            <a:endParaRPr lang="en-US" dirty="0"/>
-          </a:p>
-        </p:txBody>
-      </p:sp>
       <p:sp>
         <p:nvSpPr>
           <p:cNvPr id="5" name="Slide Number Placeholder 4">
@@ -6949,36 +6866,6 @@
               <a:rPr lang="en-US" dirty="0"/>
               <a:t>API Example 2: https://www.geoboundaries.org/</a:t>
             </a:r>
-          </a:p>
-        </p:txBody>
-      </p:sp>
-      <p:sp>
-        <p:nvSpPr>
-          <p:cNvPr id="4" name="Date Placeholder 3">
-            <a:extLst>
-              <a:ext uri="{FF2B5EF4-FFF2-40B4-BE49-F238E27FC236}">
-                <a16:creationId xmlns:a16="http://schemas.microsoft.com/office/drawing/2014/main" id="{655AC432-702E-4E27-9A2D-421B517886B7}"/>
-              </a:ext>
-            </a:extLst>
-          </p:cNvPr>
-          <p:cNvSpPr>
-            <a:spLocks noGrp="1"/>
-          </p:cNvSpPr>
-          <p:nvPr>
-            <p:ph type="dt" sz="half" idx="10"/>
-          </p:nvPr>
-        </p:nvSpPr>
-        <p:spPr/>
-        <p:txBody>
-          <a:bodyPr/>
-          <a:lstStyle/>
-          <a:p>
-            <a:fld id="{D9AFFF4A-806C-EA44-A220-CFCF99192DAA}" type="datetime1">
-              <a:rPr lang="en-US" smtClean="0"/>
-              <a:pPr/>
-              <a:t>12/4/2023</a:t>
-            </a:fld>
-            <a:endParaRPr lang="en-US" dirty="0"/>
           </a:p>
         </p:txBody>
       </p:sp>
@@ -7126,36 +7013,6 @@
           <a:chExt cx="0" cy="0"/>
         </a:xfrm>
       </p:grpSpPr>
-      <p:sp>
-        <p:nvSpPr>
-          <p:cNvPr id="4" name="Date Placeholder 3">
-            <a:extLst>
-              <a:ext uri="{FF2B5EF4-FFF2-40B4-BE49-F238E27FC236}">
-                <a16:creationId xmlns:a16="http://schemas.microsoft.com/office/drawing/2014/main" id="{655AC432-702E-4E27-9A2D-421B517886B7}"/>
-              </a:ext>
-            </a:extLst>
-          </p:cNvPr>
-          <p:cNvSpPr>
-            <a:spLocks noGrp="1"/>
-          </p:cNvSpPr>
-          <p:nvPr>
-            <p:ph type="dt" sz="half" idx="10"/>
-          </p:nvPr>
-        </p:nvSpPr>
-        <p:spPr/>
-        <p:txBody>
-          <a:bodyPr/>
-          <a:lstStyle/>
-          <a:p>
-            <a:fld id="{D9AFFF4A-806C-EA44-A220-CFCF99192DAA}" type="datetime1">
-              <a:rPr lang="en-US" smtClean="0"/>
-              <a:pPr/>
-              <a:t>12/4/2023</a:t>
-            </a:fld>
-            <a:endParaRPr lang="en-US" dirty="0"/>
-          </a:p>
-        </p:txBody>
-      </p:sp>
       <p:sp>
         <p:nvSpPr>
           <p:cNvPr id="5" name="Slide Number Placeholder 4">
@@ -7354,36 +7211,6 @@
       </p:sp>
       <p:sp>
         <p:nvSpPr>
-          <p:cNvPr id="4" name="Date Placeholder 3">
-            <a:extLst>
-              <a:ext uri="{FF2B5EF4-FFF2-40B4-BE49-F238E27FC236}">
-                <a16:creationId xmlns:a16="http://schemas.microsoft.com/office/drawing/2014/main" id="{655AC432-702E-4E27-9A2D-421B517886B7}"/>
-              </a:ext>
-            </a:extLst>
-          </p:cNvPr>
-          <p:cNvSpPr>
-            <a:spLocks noGrp="1"/>
-          </p:cNvSpPr>
-          <p:nvPr>
-            <p:ph type="dt" sz="half" idx="10"/>
-          </p:nvPr>
-        </p:nvSpPr>
-        <p:spPr/>
-        <p:txBody>
-          <a:bodyPr/>
-          <a:lstStyle/>
-          <a:p>
-            <a:fld id="{D9AFFF4A-806C-EA44-A220-CFCF99192DAA}" type="datetime1">
-              <a:rPr lang="en-US" smtClean="0"/>
-              <a:pPr/>
-              <a:t>12/4/2023</a:t>
-            </a:fld>
-            <a:endParaRPr lang="en-US" dirty="0"/>
-          </a:p>
-        </p:txBody>
-      </p:sp>
-      <p:sp>
-        <p:nvSpPr>
           <p:cNvPr id="5" name="Slide Number Placeholder 4">
             <a:extLst>
               <a:ext uri="{FF2B5EF4-FFF2-40B4-BE49-F238E27FC236}">
@@ -7556,36 +7383,6 @@
       </p:sp>
       <p:sp>
         <p:nvSpPr>
-          <p:cNvPr id="4" name="Date Placeholder 3">
-            <a:extLst>
-              <a:ext uri="{FF2B5EF4-FFF2-40B4-BE49-F238E27FC236}">
-                <a16:creationId xmlns:a16="http://schemas.microsoft.com/office/drawing/2014/main" id="{655AC432-702E-4E27-9A2D-421B517886B7}"/>
-              </a:ext>
-            </a:extLst>
-          </p:cNvPr>
-          <p:cNvSpPr>
-            <a:spLocks noGrp="1"/>
-          </p:cNvSpPr>
-          <p:nvPr>
-            <p:ph type="dt" sz="half" idx="10"/>
-          </p:nvPr>
-        </p:nvSpPr>
-        <p:spPr/>
-        <p:txBody>
-          <a:bodyPr/>
-          <a:lstStyle/>
-          <a:p>
-            <a:fld id="{D9AFFF4A-806C-EA44-A220-CFCF99192DAA}" type="datetime1">
-              <a:rPr lang="en-US" smtClean="0"/>
-              <a:pPr/>
-              <a:t>12/4/2023</a:t>
-            </a:fld>
-            <a:endParaRPr lang="en-US" dirty="0"/>
-          </a:p>
-        </p:txBody>
-      </p:sp>
-      <p:sp>
-        <p:nvSpPr>
           <p:cNvPr id="5" name="Slide Number Placeholder 4">
             <a:extLst>
               <a:ext uri="{FF2B5EF4-FFF2-40B4-BE49-F238E27FC236}">
@@ -7776,36 +7573,6 @@
               <a:rPr lang="en-US" dirty="0"/>
               <a:t>Exploring API results</a:t>
             </a:r>
-          </a:p>
-        </p:txBody>
-      </p:sp>
-      <p:sp>
-        <p:nvSpPr>
-          <p:cNvPr id="4" name="Date Placeholder 3">
-            <a:extLst>
-              <a:ext uri="{FF2B5EF4-FFF2-40B4-BE49-F238E27FC236}">
-                <a16:creationId xmlns:a16="http://schemas.microsoft.com/office/drawing/2014/main" id="{655AC432-702E-4E27-9A2D-421B517886B7}"/>
-              </a:ext>
-            </a:extLst>
-          </p:cNvPr>
-          <p:cNvSpPr>
-            <a:spLocks noGrp="1"/>
-          </p:cNvSpPr>
-          <p:nvPr>
-            <p:ph type="dt" sz="half" idx="10"/>
-          </p:nvPr>
-        </p:nvSpPr>
-        <p:spPr/>
-        <p:txBody>
-          <a:bodyPr/>
-          <a:lstStyle/>
-          <a:p>
-            <a:fld id="{D9AFFF4A-806C-EA44-A220-CFCF99192DAA}" type="datetime1">
-              <a:rPr lang="en-US" smtClean="0"/>
-              <a:pPr/>
-              <a:t>12/4/2023</a:t>
-            </a:fld>
-            <a:endParaRPr lang="en-US" dirty="0"/>
           </a:p>
         </p:txBody>
       </p:sp>
@@ -8330,52 +8097,6 @@
               <a:rPr lang="en-US" dirty="0"/>
               <a:t>restaurant.com</a:t>
             </a:r>
-          </a:p>
-        </p:txBody>
-      </p:sp>
-      <p:sp>
-        <p:nvSpPr>
-          <p:cNvPr id="4" name="Date Placeholder 3">
-            <a:extLst>
-              <a:ext uri="{FF2B5EF4-FFF2-40B4-BE49-F238E27FC236}">
-                <a16:creationId xmlns:a16="http://schemas.microsoft.com/office/drawing/2014/main" id="{60B975FA-43A5-4E5F-8A74-60EE1E5C989A}"/>
-              </a:ext>
-            </a:extLst>
-          </p:cNvPr>
-          <p:cNvSpPr>
-            <a:spLocks noGrp="1"/>
-          </p:cNvSpPr>
-          <p:nvPr>
-            <p:ph type="dt" sz="half" idx="10"/>
-          </p:nvPr>
-        </p:nvSpPr>
-        <p:spPr>
-          <a:xfrm>
-            <a:off x="465512" y="6459785"/>
-            <a:ext cx="2618510" cy="365125"/>
-          </a:xfrm>
-        </p:spPr>
-        <p:txBody>
-          <a:bodyPr anchor="ctr">
-            <a:normAutofit/>
-          </a:bodyPr>
-          <a:lstStyle/>
-          <a:p>
-            <a:pPr>
-              <a:spcAft>
-                <a:spcPts val="600"/>
-              </a:spcAft>
-            </a:pPr>
-            <a:fld id="{D9AFFF4A-806C-EA44-A220-CFCF99192DAA}" type="datetime1">
-              <a:rPr lang="en-US" smtClean="0"/>
-              <a:pPr>
-                <a:spcAft>
-                  <a:spcPts val="600"/>
-                </a:spcAft>
-              </a:pPr>
-              <a:t>12/4/2023</a:t>
-            </a:fld>
-            <a:endParaRPr lang="en-US" dirty="0"/>
           </a:p>
         </p:txBody>
       </p:sp>
@@ -9246,36 +8967,6 @@
       </p:sp>
       <p:sp>
         <p:nvSpPr>
-          <p:cNvPr id="4" name="Date Placeholder 3">
-            <a:extLst>
-              <a:ext uri="{FF2B5EF4-FFF2-40B4-BE49-F238E27FC236}">
-                <a16:creationId xmlns:a16="http://schemas.microsoft.com/office/drawing/2014/main" id="{655AC432-702E-4E27-9A2D-421B517886B7}"/>
-              </a:ext>
-            </a:extLst>
-          </p:cNvPr>
-          <p:cNvSpPr>
-            <a:spLocks noGrp="1"/>
-          </p:cNvSpPr>
-          <p:nvPr>
-            <p:ph type="dt" sz="half" idx="10"/>
-          </p:nvPr>
-        </p:nvSpPr>
-        <p:spPr/>
-        <p:txBody>
-          <a:bodyPr/>
-          <a:lstStyle/>
-          <a:p>
-            <a:fld id="{D9AFFF4A-806C-EA44-A220-CFCF99192DAA}" type="datetime1">
-              <a:rPr lang="en-US" smtClean="0"/>
-              <a:pPr/>
-              <a:t>12/4/2023</a:t>
-            </a:fld>
-            <a:endParaRPr lang="en-US" dirty="0"/>
-          </a:p>
-        </p:txBody>
-      </p:sp>
-      <p:sp>
-        <p:nvSpPr>
           <p:cNvPr id="5" name="Slide Number Placeholder 4">
             <a:extLst>
               <a:ext uri="{FF2B5EF4-FFF2-40B4-BE49-F238E27FC236}">
@@ -11204,36 +10895,6 @@
       </p:sp>
       <p:sp>
         <p:nvSpPr>
-          <p:cNvPr id="4" name="Date Placeholder 3">
-            <a:extLst>
-              <a:ext uri="{FF2B5EF4-FFF2-40B4-BE49-F238E27FC236}">
-                <a16:creationId xmlns:a16="http://schemas.microsoft.com/office/drawing/2014/main" id="{655AC432-702E-4E27-9A2D-421B517886B7}"/>
-              </a:ext>
-            </a:extLst>
-          </p:cNvPr>
-          <p:cNvSpPr>
-            <a:spLocks noGrp="1"/>
-          </p:cNvSpPr>
-          <p:nvPr>
-            <p:ph type="dt" sz="half" idx="10"/>
-          </p:nvPr>
-        </p:nvSpPr>
-        <p:spPr/>
-        <p:txBody>
-          <a:bodyPr/>
-          <a:lstStyle/>
-          <a:p>
-            <a:fld id="{D9AFFF4A-806C-EA44-A220-CFCF99192DAA}" type="datetime1">
-              <a:rPr lang="en-US" smtClean="0"/>
-              <a:pPr/>
-              <a:t>12/4/2023</a:t>
-            </a:fld>
-            <a:endParaRPr lang="en-US" dirty="0"/>
-          </a:p>
-        </p:txBody>
-      </p:sp>
-      <p:sp>
-        <p:nvSpPr>
           <p:cNvPr id="5" name="Slide Number Placeholder 4">
             <a:extLst>
               <a:ext uri="{FF2B5EF4-FFF2-40B4-BE49-F238E27FC236}">
@@ -13695,36 +13356,6 @@
       </p:sp>
       <p:sp>
         <p:nvSpPr>
-          <p:cNvPr id="4" name="Date Placeholder 3">
-            <a:extLst>
-              <a:ext uri="{FF2B5EF4-FFF2-40B4-BE49-F238E27FC236}">
-                <a16:creationId xmlns:a16="http://schemas.microsoft.com/office/drawing/2014/main" id="{7672CD20-96D8-4963-9153-64437BC775C4}"/>
-              </a:ext>
-            </a:extLst>
-          </p:cNvPr>
-          <p:cNvSpPr>
-            <a:spLocks noGrp="1"/>
-          </p:cNvSpPr>
-          <p:nvPr>
-            <p:ph type="dt" sz="half" idx="10"/>
-          </p:nvPr>
-        </p:nvSpPr>
-        <p:spPr/>
-        <p:txBody>
-          <a:bodyPr/>
-          <a:lstStyle/>
-          <a:p>
-            <a:fld id="{D9AFFF4A-806C-EA44-A220-CFCF99192DAA}" type="datetime1">
-              <a:rPr lang="en-US" smtClean="0"/>
-              <a:pPr/>
-              <a:t>12/4/2023</a:t>
-            </a:fld>
-            <a:endParaRPr lang="en-US" dirty="0"/>
-          </a:p>
-        </p:txBody>
-      </p:sp>
-      <p:sp>
-        <p:nvSpPr>
           <p:cNvPr id="5" name="Slide Number Placeholder 4">
             <a:extLst>
               <a:ext uri="{FF2B5EF4-FFF2-40B4-BE49-F238E27FC236}">
@@ -13869,36 +13500,6 @@
       </p:sp>
       <p:sp>
         <p:nvSpPr>
-          <p:cNvPr id="4" name="Date Placeholder 3">
-            <a:extLst>
-              <a:ext uri="{FF2B5EF4-FFF2-40B4-BE49-F238E27FC236}">
-                <a16:creationId xmlns:a16="http://schemas.microsoft.com/office/drawing/2014/main" id="{7672CD20-96D8-4963-9153-64437BC775C4}"/>
-              </a:ext>
-            </a:extLst>
-          </p:cNvPr>
-          <p:cNvSpPr>
-            <a:spLocks noGrp="1"/>
-          </p:cNvSpPr>
-          <p:nvPr>
-            <p:ph type="dt" sz="half" idx="10"/>
-          </p:nvPr>
-        </p:nvSpPr>
-        <p:spPr/>
-        <p:txBody>
-          <a:bodyPr/>
-          <a:lstStyle/>
-          <a:p>
-            <a:fld id="{D9AFFF4A-806C-EA44-A220-CFCF99192DAA}" type="datetime1">
-              <a:rPr lang="en-US" smtClean="0"/>
-              <a:pPr/>
-              <a:t>12/4/2023</a:t>
-            </a:fld>
-            <a:endParaRPr lang="en-US" dirty="0"/>
-          </a:p>
-        </p:txBody>
-      </p:sp>
-      <p:sp>
-        <p:nvSpPr>
           <p:cNvPr id="5" name="Slide Number Placeholder 4">
             <a:extLst>
               <a:ext uri="{FF2B5EF4-FFF2-40B4-BE49-F238E27FC236}">
@@ -14088,36 +13689,6 @@
       </p:sp>
       <p:sp>
         <p:nvSpPr>
-          <p:cNvPr id="4" name="Date Placeholder 3">
-            <a:extLst>
-              <a:ext uri="{FF2B5EF4-FFF2-40B4-BE49-F238E27FC236}">
-                <a16:creationId xmlns:a16="http://schemas.microsoft.com/office/drawing/2014/main" id="{7672CD20-96D8-4963-9153-64437BC775C4}"/>
-              </a:ext>
-            </a:extLst>
-          </p:cNvPr>
-          <p:cNvSpPr>
-            <a:spLocks noGrp="1"/>
-          </p:cNvSpPr>
-          <p:nvPr>
-            <p:ph type="dt" sz="half" idx="10"/>
-          </p:nvPr>
-        </p:nvSpPr>
-        <p:spPr/>
-        <p:txBody>
-          <a:bodyPr/>
-          <a:lstStyle/>
-          <a:p>
-            <a:fld id="{D9AFFF4A-806C-EA44-A220-CFCF99192DAA}" type="datetime1">
-              <a:rPr lang="en-US" smtClean="0"/>
-              <a:pPr/>
-              <a:t>12/4/2023</a:t>
-            </a:fld>
-            <a:endParaRPr lang="en-US" dirty="0"/>
-          </a:p>
-        </p:txBody>
-      </p:sp>
-      <p:sp>
-        <p:nvSpPr>
           <p:cNvPr id="5" name="Slide Number Placeholder 4">
             <a:extLst>
               <a:ext uri="{FF2B5EF4-FFF2-40B4-BE49-F238E27FC236}">
@@ -14201,36 +13772,6 @@
               <a:rPr lang="en-US" dirty="0"/>
               <a:t>API Example 1: http://open-notify.org/</a:t>
             </a:r>
-          </a:p>
-        </p:txBody>
-      </p:sp>
-      <p:sp>
-        <p:nvSpPr>
-          <p:cNvPr id="4" name="Date Placeholder 3">
-            <a:extLst>
-              <a:ext uri="{FF2B5EF4-FFF2-40B4-BE49-F238E27FC236}">
-                <a16:creationId xmlns:a16="http://schemas.microsoft.com/office/drawing/2014/main" id="{655AC432-702E-4E27-9A2D-421B517886B7}"/>
-              </a:ext>
-            </a:extLst>
-          </p:cNvPr>
-          <p:cNvSpPr>
-            <a:spLocks noGrp="1"/>
-          </p:cNvSpPr>
-          <p:nvPr>
-            <p:ph type="dt" sz="half" idx="10"/>
-          </p:nvPr>
-        </p:nvSpPr>
-        <p:spPr/>
-        <p:txBody>
-          <a:bodyPr/>
-          <a:lstStyle/>
-          <a:p>
-            <a:fld id="{D9AFFF4A-806C-EA44-A220-CFCF99192DAA}" type="datetime1">
-              <a:rPr lang="en-US" smtClean="0"/>
-              <a:pPr/>
-              <a:t>12/4/2023</a:t>
-            </a:fld>
-            <a:endParaRPr lang="en-US" dirty="0"/>
           </a:p>
         </p:txBody>
       </p:sp>

</xml_diff>